<commit_message>
Examples till Raw Types
</commit_message>
<xml_diff>
--- a/src/main/resources/JavaGenerics.pptx
+++ b/src/main/resources/JavaGenerics.pptx
@@ -20,11 +20,11 @@
     <p:sldId id="372" r:id="rId11"/>
     <p:sldId id="364" r:id="rId12"/>
     <p:sldId id="371" r:id="rId13"/>
-    <p:sldId id="365" r:id="rId14"/>
-    <p:sldId id="381" r:id="rId15"/>
-    <p:sldId id="382" r:id="rId16"/>
-    <p:sldId id="375" r:id="rId17"/>
-    <p:sldId id="373" r:id="rId18"/>
+    <p:sldId id="375" r:id="rId14"/>
+    <p:sldId id="373" r:id="rId15"/>
+    <p:sldId id="365" r:id="rId16"/>
+    <p:sldId id="381" r:id="rId17"/>
+    <p:sldId id="382" r:id="rId18"/>
     <p:sldId id="379" r:id="rId19"/>
     <p:sldId id="378" r:id="rId20"/>
     <p:sldId id="380" r:id="rId21"/>
@@ -267,7 +267,7 @@
           <a:p>
             <a:fld id="{085A4362-1548-4C12-A63A-A7FA9FF20440}" type="datetimeFigureOut">
               <a:rPr lang="en-IN" smtClean="0"/>
-              <a:t>11-04-2020</a:t>
+              <a:t>12-04-2020</a:t>
             </a:fld>
             <a:endParaRPr lang="en-IN"/>
           </a:p>
@@ -619,6 +619,101 @@
 </p:notes>
 </file>
 
+<file path=ppt/notesSlides/notesSlide10.xml><?xml version="1.0" encoding="utf-8"?>
+<p:notes xmlns:a="http://schemas.openxmlformats.org/drawingml/2006/main" xmlns:r="http://schemas.openxmlformats.org/officeDocument/2006/relationships" xmlns:p="http://schemas.openxmlformats.org/presentationml/2006/main">
+  <p:cSld>
+    <p:spTree>
+      <p:nvGrpSpPr>
+        <p:cNvPr id="1" name=""/>
+        <p:cNvGrpSpPr/>
+        <p:nvPr/>
+      </p:nvGrpSpPr>
+      <p:grpSpPr>
+        <a:xfrm>
+          <a:off x="0" y="0"/>
+          <a:ext cx="0" cy="0"/>
+          <a:chOff x="0" y="0"/>
+          <a:chExt cx="0" cy="0"/>
+        </a:xfrm>
+      </p:grpSpPr>
+      <p:sp>
+        <p:nvSpPr>
+          <p:cNvPr id="2" name="Slide Image Placeholder 1"/>
+          <p:cNvSpPr>
+            <a:spLocks noGrp="1" noRot="1" noChangeAspect="1"/>
+          </p:cNvSpPr>
+          <p:nvPr>
+            <p:ph type="sldImg"/>
+          </p:nvPr>
+        </p:nvSpPr>
+        <p:spPr/>
+      </p:sp>
+      <p:sp>
+        <p:nvSpPr>
+          <p:cNvPr id="3" name="Notes Placeholder 2"/>
+          <p:cNvSpPr>
+            <a:spLocks noGrp="1"/>
+          </p:cNvSpPr>
+          <p:nvPr>
+            <p:ph type="body" idx="1"/>
+          </p:nvPr>
+        </p:nvSpPr>
+        <p:spPr/>
+        <p:txBody>
+          <a:bodyPr/>
+          <a:lstStyle/>
+          <a:p>
+            <a:r>
+              <a:rPr lang="en-GB" sz="1200" kern="1200" dirty="0" smtClean="0">
+                <a:solidFill>
+                  <a:schemeClr val="tx1"/>
+                </a:solidFill>
+                <a:latin typeface="+mn-lt"/>
+                <a:ea typeface="+mn-ea"/>
+                <a:cs typeface="+mn-cs"/>
+              </a:rPr>
+              <a:t>RawTypesExample.java</a:t>
+            </a:r>
+            <a:endParaRPr lang="en-GB" dirty="0"/>
+          </a:p>
+        </p:txBody>
+      </p:sp>
+      <p:sp>
+        <p:nvSpPr>
+          <p:cNvPr id="4" name="Slide Number Placeholder 3"/>
+          <p:cNvSpPr>
+            <a:spLocks noGrp="1"/>
+          </p:cNvSpPr>
+          <p:nvPr>
+            <p:ph type="sldNum" sz="quarter" idx="10"/>
+          </p:nvPr>
+        </p:nvSpPr>
+        <p:spPr/>
+        <p:txBody>
+          <a:bodyPr/>
+          <a:lstStyle/>
+          <a:p>
+            <a:fld id="{EB8B6B8F-4498-4E9D-8DE1-125892E25737}" type="slidenum">
+              <a:rPr lang="en-IN" smtClean="0"/>
+              <a:t>19</a:t>
+            </a:fld>
+            <a:endParaRPr lang="en-IN"/>
+          </a:p>
+        </p:txBody>
+      </p:sp>
+    </p:spTree>
+    <p:extLst>
+      <p:ext uri="{BB962C8B-B14F-4D97-AF65-F5344CB8AC3E}">
+        <p14:creationId xmlns:p14="http://schemas.microsoft.com/office/powerpoint/2010/main" val="1093461668"/>
+      </p:ext>
+    </p:extLst>
+  </p:cSld>
+  <p:clrMapOvr>
+    <a:masterClrMapping/>
+  </p:clrMapOvr>
+</p:notes>
+</file>
+
 <file path=ppt/notesSlides/notesSlide2.xml><?xml version="1.0" encoding="utf-8"?>
 <p:notes xmlns:a="http://schemas.openxmlformats.org/drawingml/2006/main" xmlns:r="http://schemas.openxmlformats.org/officeDocument/2006/relationships" xmlns:p="http://schemas.openxmlformats.org/presentationml/2006/main">
   <p:cSld>
@@ -747,6 +842,17 @@
           <a:bodyPr/>
           <a:lstStyle/>
           <a:p>
+            <a:r>
+              <a:rPr lang="en-GB" sz="1200" kern="1200" dirty="0" smtClean="0">
+                <a:solidFill>
+                  <a:schemeClr val="tx1"/>
+                </a:solidFill>
+                <a:latin typeface="+mn-lt"/>
+                <a:ea typeface="+mn-ea"/>
+                <a:cs typeface="+mn-cs"/>
+              </a:rPr>
+              <a:t>GenericClassExample.java</a:t>
+            </a:r>
             <a:endParaRPr lang="en-IN" dirty="0"/>
           </a:p>
         </p:txBody>
@@ -831,6 +937,17 @@
           <a:bodyPr/>
           <a:lstStyle/>
           <a:p>
+            <a:r>
+              <a:rPr lang="en-GB" sz="1200" kern="1200" dirty="0" smtClean="0">
+                <a:solidFill>
+                  <a:schemeClr val="tx1"/>
+                </a:solidFill>
+                <a:latin typeface="+mn-lt"/>
+                <a:ea typeface="+mn-ea"/>
+                <a:cs typeface="+mn-cs"/>
+              </a:rPr>
+              <a:t>GenericsWithCollectionsExample.java</a:t>
+            </a:r>
             <a:endParaRPr lang="en-IN" dirty="0"/>
           </a:p>
         </p:txBody>
@@ -862,6 +979,515 @@
     <p:extLst>
       <p:ext uri="{BB962C8B-B14F-4D97-AF65-F5344CB8AC3E}">
         <p14:creationId xmlns:p14="http://schemas.microsoft.com/office/powerpoint/2010/main" val="3064946480"/>
+      </p:ext>
+    </p:extLst>
+  </p:cSld>
+  <p:clrMapOvr>
+    <a:masterClrMapping/>
+  </p:clrMapOvr>
+</p:notes>
+</file>
+
+<file path=ppt/notesSlides/notesSlide5.xml><?xml version="1.0" encoding="utf-8"?>
+<p:notes xmlns:a="http://schemas.openxmlformats.org/drawingml/2006/main" xmlns:r="http://schemas.openxmlformats.org/officeDocument/2006/relationships" xmlns:p="http://schemas.openxmlformats.org/presentationml/2006/main">
+  <p:cSld>
+    <p:spTree>
+      <p:nvGrpSpPr>
+        <p:cNvPr id="1" name=""/>
+        <p:cNvGrpSpPr/>
+        <p:nvPr/>
+      </p:nvGrpSpPr>
+      <p:grpSpPr>
+        <a:xfrm>
+          <a:off x="0" y="0"/>
+          <a:ext cx="0" cy="0"/>
+          <a:chOff x="0" y="0"/>
+          <a:chExt cx="0" cy="0"/>
+        </a:xfrm>
+      </p:grpSpPr>
+      <p:sp>
+        <p:nvSpPr>
+          <p:cNvPr id="2" name="Slide Image Placeholder 1"/>
+          <p:cNvSpPr>
+            <a:spLocks noGrp="1" noRot="1" noChangeAspect="1"/>
+          </p:cNvSpPr>
+          <p:nvPr>
+            <p:ph type="sldImg"/>
+          </p:nvPr>
+        </p:nvSpPr>
+        <p:spPr/>
+      </p:sp>
+      <p:sp>
+        <p:nvSpPr>
+          <p:cNvPr id="3" name="Notes Placeholder 2"/>
+          <p:cNvSpPr>
+            <a:spLocks noGrp="1"/>
+          </p:cNvSpPr>
+          <p:nvPr>
+            <p:ph type="body" idx="1"/>
+          </p:nvPr>
+        </p:nvSpPr>
+        <p:spPr/>
+        <p:txBody>
+          <a:bodyPr/>
+          <a:lstStyle/>
+          <a:p>
+            <a:r>
+              <a:rPr lang="en-GB" sz="1200" kern="1200" dirty="0" smtClean="0">
+                <a:solidFill>
+                  <a:schemeClr val="tx1"/>
+                </a:solidFill>
+                <a:latin typeface="+mn-lt"/>
+                <a:ea typeface="+mn-ea"/>
+                <a:cs typeface="+mn-cs"/>
+              </a:rPr>
+              <a:t>TypeParameterNamingConventionExample.java</a:t>
+            </a:r>
+            <a:endParaRPr lang="en-GB" dirty="0"/>
+          </a:p>
+        </p:txBody>
+      </p:sp>
+      <p:sp>
+        <p:nvSpPr>
+          <p:cNvPr id="4" name="Slide Number Placeholder 3"/>
+          <p:cNvSpPr>
+            <a:spLocks noGrp="1"/>
+          </p:cNvSpPr>
+          <p:nvPr>
+            <p:ph type="sldNum" sz="quarter" idx="10"/>
+          </p:nvPr>
+        </p:nvSpPr>
+        <p:spPr/>
+        <p:txBody>
+          <a:bodyPr/>
+          <a:lstStyle/>
+          <a:p>
+            <a:fld id="{EB8B6B8F-4498-4E9D-8DE1-125892E25737}" type="slidenum">
+              <a:rPr lang="en-IN" smtClean="0"/>
+              <a:t>11</a:t>
+            </a:fld>
+            <a:endParaRPr lang="en-IN"/>
+          </a:p>
+        </p:txBody>
+      </p:sp>
+    </p:spTree>
+    <p:extLst>
+      <p:ext uri="{BB962C8B-B14F-4D97-AF65-F5344CB8AC3E}">
+        <p14:creationId xmlns:p14="http://schemas.microsoft.com/office/powerpoint/2010/main" val="3046134969"/>
+      </p:ext>
+    </p:extLst>
+  </p:cSld>
+  <p:clrMapOvr>
+    <a:masterClrMapping/>
+  </p:clrMapOvr>
+</p:notes>
+</file>
+
+<file path=ppt/notesSlides/notesSlide6.xml><?xml version="1.0" encoding="utf-8"?>
+<p:notes xmlns:a="http://schemas.openxmlformats.org/drawingml/2006/main" xmlns:r="http://schemas.openxmlformats.org/officeDocument/2006/relationships" xmlns:p="http://schemas.openxmlformats.org/presentationml/2006/main">
+  <p:cSld>
+    <p:spTree>
+      <p:nvGrpSpPr>
+        <p:cNvPr id="1" name=""/>
+        <p:cNvGrpSpPr/>
+        <p:nvPr/>
+      </p:nvGrpSpPr>
+      <p:grpSpPr>
+        <a:xfrm>
+          <a:off x="0" y="0"/>
+          <a:ext cx="0" cy="0"/>
+          <a:chOff x="0" y="0"/>
+          <a:chExt cx="0" cy="0"/>
+        </a:xfrm>
+      </p:grpSpPr>
+      <p:sp>
+        <p:nvSpPr>
+          <p:cNvPr id="2" name="Slide Image Placeholder 1"/>
+          <p:cNvSpPr>
+            <a:spLocks noGrp="1" noRot="1" noChangeAspect="1"/>
+          </p:cNvSpPr>
+          <p:nvPr>
+            <p:ph type="sldImg"/>
+          </p:nvPr>
+        </p:nvSpPr>
+        <p:spPr/>
+      </p:sp>
+      <p:sp>
+        <p:nvSpPr>
+          <p:cNvPr id="3" name="Notes Placeholder 2"/>
+          <p:cNvSpPr>
+            <a:spLocks noGrp="1"/>
+          </p:cNvSpPr>
+          <p:nvPr>
+            <p:ph type="body" idx="1"/>
+          </p:nvPr>
+        </p:nvSpPr>
+        <p:spPr/>
+        <p:txBody>
+          <a:bodyPr/>
+          <a:lstStyle/>
+          <a:p>
+            <a:pPr marL="0" marR="0" lvl="0" indent="0" algn="l" defTabSz="914400" rtl="0" eaLnBrk="1" fontAlgn="auto" latinLnBrk="0" hangingPunct="1">
+              <a:lnSpc>
+                <a:spcPct val="100000"/>
+              </a:lnSpc>
+              <a:spcBef>
+                <a:spcPts val="0"/>
+              </a:spcBef>
+              <a:spcAft>
+                <a:spcPts val="0"/>
+              </a:spcAft>
+              <a:buClrTx/>
+              <a:buSzTx/>
+              <a:buFontTx/>
+              <a:buNone/>
+              <a:tabLst/>
+              <a:defRPr/>
+            </a:pPr>
+            <a:endParaRPr lang="en-GB" dirty="0"/>
+          </a:p>
+        </p:txBody>
+      </p:sp>
+      <p:sp>
+        <p:nvSpPr>
+          <p:cNvPr id="4" name="Slide Number Placeholder 3"/>
+          <p:cNvSpPr>
+            <a:spLocks noGrp="1"/>
+          </p:cNvSpPr>
+          <p:nvPr>
+            <p:ph type="sldNum" sz="quarter" idx="10"/>
+          </p:nvPr>
+        </p:nvSpPr>
+        <p:spPr/>
+        <p:txBody>
+          <a:bodyPr/>
+          <a:lstStyle/>
+          <a:p>
+            <a:fld id="{EB8B6B8F-4498-4E9D-8DE1-125892E25737}" type="slidenum">
+              <a:rPr lang="en-IN" smtClean="0"/>
+              <a:t>13</a:t>
+            </a:fld>
+            <a:endParaRPr lang="en-IN"/>
+          </a:p>
+        </p:txBody>
+      </p:sp>
+    </p:spTree>
+    <p:extLst>
+      <p:ext uri="{BB962C8B-B14F-4D97-AF65-F5344CB8AC3E}">
+        <p14:creationId xmlns:p14="http://schemas.microsoft.com/office/powerpoint/2010/main" val="2412524608"/>
+      </p:ext>
+    </p:extLst>
+  </p:cSld>
+  <p:clrMapOvr>
+    <a:masterClrMapping/>
+  </p:clrMapOvr>
+</p:notes>
+</file>
+
+<file path=ppt/notesSlides/notesSlide7.xml><?xml version="1.0" encoding="utf-8"?>
+<p:notes xmlns:a="http://schemas.openxmlformats.org/drawingml/2006/main" xmlns:r="http://schemas.openxmlformats.org/officeDocument/2006/relationships" xmlns:p="http://schemas.openxmlformats.org/presentationml/2006/main">
+  <p:cSld>
+    <p:spTree>
+      <p:nvGrpSpPr>
+        <p:cNvPr id="1" name=""/>
+        <p:cNvGrpSpPr/>
+        <p:nvPr/>
+      </p:nvGrpSpPr>
+      <p:grpSpPr>
+        <a:xfrm>
+          <a:off x="0" y="0"/>
+          <a:ext cx="0" cy="0"/>
+          <a:chOff x="0" y="0"/>
+          <a:chExt cx="0" cy="0"/>
+        </a:xfrm>
+      </p:grpSpPr>
+      <p:sp>
+        <p:nvSpPr>
+          <p:cNvPr id="2" name="Slide Image Placeholder 1"/>
+          <p:cNvSpPr>
+            <a:spLocks noGrp="1" noRot="1" noChangeAspect="1"/>
+          </p:cNvSpPr>
+          <p:nvPr>
+            <p:ph type="sldImg"/>
+          </p:nvPr>
+        </p:nvSpPr>
+        <p:spPr/>
+      </p:sp>
+      <p:sp>
+        <p:nvSpPr>
+          <p:cNvPr id="3" name="Notes Placeholder 2"/>
+          <p:cNvSpPr>
+            <a:spLocks noGrp="1"/>
+          </p:cNvSpPr>
+          <p:nvPr>
+            <p:ph type="body" idx="1"/>
+          </p:nvPr>
+        </p:nvSpPr>
+        <p:spPr/>
+        <p:txBody>
+          <a:bodyPr/>
+          <a:lstStyle/>
+          <a:p>
+            <a:endParaRPr lang="en-GB" dirty="0"/>
+          </a:p>
+        </p:txBody>
+      </p:sp>
+      <p:sp>
+        <p:nvSpPr>
+          <p:cNvPr id="4" name="Slide Number Placeholder 3"/>
+          <p:cNvSpPr>
+            <a:spLocks noGrp="1"/>
+          </p:cNvSpPr>
+          <p:nvPr>
+            <p:ph type="sldNum" sz="quarter" idx="10"/>
+          </p:nvPr>
+        </p:nvSpPr>
+        <p:spPr/>
+        <p:txBody>
+          <a:bodyPr/>
+          <a:lstStyle/>
+          <a:p>
+            <a:fld id="{EB8B6B8F-4498-4E9D-8DE1-125892E25737}" type="slidenum">
+              <a:rPr lang="en-IN" smtClean="0"/>
+              <a:t>15</a:t>
+            </a:fld>
+            <a:endParaRPr lang="en-IN"/>
+          </a:p>
+        </p:txBody>
+      </p:sp>
+    </p:spTree>
+    <p:extLst>
+      <p:ext uri="{BB962C8B-B14F-4D97-AF65-F5344CB8AC3E}">
+        <p14:creationId xmlns:p14="http://schemas.microsoft.com/office/powerpoint/2010/main" val="1298742586"/>
+      </p:ext>
+    </p:extLst>
+  </p:cSld>
+  <p:clrMapOvr>
+    <a:masterClrMapping/>
+  </p:clrMapOvr>
+</p:notes>
+</file>
+
+<file path=ppt/notesSlides/notesSlide8.xml><?xml version="1.0" encoding="utf-8"?>
+<p:notes xmlns:a="http://schemas.openxmlformats.org/drawingml/2006/main" xmlns:r="http://schemas.openxmlformats.org/officeDocument/2006/relationships" xmlns:p="http://schemas.openxmlformats.org/presentationml/2006/main">
+  <p:cSld>
+    <p:spTree>
+      <p:nvGrpSpPr>
+        <p:cNvPr id="1" name=""/>
+        <p:cNvGrpSpPr/>
+        <p:nvPr/>
+      </p:nvGrpSpPr>
+      <p:grpSpPr>
+        <a:xfrm>
+          <a:off x="0" y="0"/>
+          <a:ext cx="0" cy="0"/>
+          <a:chOff x="0" y="0"/>
+          <a:chExt cx="0" cy="0"/>
+        </a:xfrm>
+      </p:grpSpPr>
+      <p:sp>
+        <p:nvSpPr>
+          <p:cNvPr id="2" name="Slide Image Placeholder 1"/>
+          <p:cNvSpPr>
+            <a:spLocks noGrp="1" noRot="1" noChangeAspect="1"/>
+          </p:cNvSpPr>
+          <p:nvPr>
+            <p:ph type="sldImg"/>
+          </p:nvPr>
+        </p:nvSpPr>
+        <p:spPr/>
+      </p:sp>
+      <p:sp>
+        <p:nvSpPr>
+          <p:cNvPr id="3" name="Notes Placeholder 2"/>
+          <p:cNvSpPr>
+            <a:spLocks noGrp="1"/>
+          </p:cNvSpPr>
+          <p:nvPr>
+            <p:ph type="body" idx="1"/>
+          </p:nvPr>
+        </p:nvSpPr>
+        <p:spPr/>
+        <p:txBody>
+          <a:bodyPr/>
+          <a:lstStyle/>
+          <a:p>
+            <a:endParaRPr lang="en-GB" dirty="0"/>
+          </a:p>
+        </p:txBody>
+      </p:sp>
+      <p:sp>
+        <p:nvSpPr>
+          <p:cNvPr id="4" name="Slide Number Placeholder 3"/>
+          <p:cNvSpPr>
+            <a:spLocks noGrp="1"/>
+          </p:cNvSpPr>
+          <p:nvPr>
+            <p:ph type="sldNum" sz="quarter" idx="10"/>
+          </p:nvPr>
+        </p:nvSpPr>
+        <p:spPr/>
+        <p:txBody>
+          <a:bodyPr/>
+          <a:lstStyle/>
+          <a:p>
+            <a:fld id="{EB8B6B8F-4498-4E9D-8DE1-125892E25737}" type="slidenum">
+              <a:rPr lang="en-IN" smtClean="0"/>
+              <a:t>16</a:t>
+            </a:fld>
+            <a:endParaRPr lang="en-IN"/>
+          </a:p>
+        </p:txBody>
+      </p:sp>
+    </p:spTree>
+    <p:extLst>
+      <p:ext uri="{BB962C8B-B14F-4D97-AF65-F5344CB8AC3E}">
+        <p14:creationId xmlns:p14="http://schemas.microsoft.com/office/powerpoint/2010/main" val="2800729074"/>
+      </p:ext>
+    </p:extLst>
+  </p:cSld>
+  <p:clrMapOvr>
+    <a:masterClrMapping/>
+  </p:clrMapOvr>
+</p:notes>
+</file>
+
+<file path=ppt/notesSlides/notesSlide9.xml><?xml version="1.0" encoding="utf-8"?>
+<p:notes xmlns:a="http://schemas.openxmlformats.org/drawingml/2006/main" xmlns:r="http://schemas.openxmlformats.org/officeDocument/2006/relationships" xmlns:p="http://schemas.openxmlformats.org/presentationml/2006/main">
+  <p:cSld>
+    <p:spTree>
+      <p:nvGrpSpPr>
+        <p:cNvPr id="1" name=""/>
+        <p:cNvGrpSpPr/>
+        <p:nvPr/>
+      </p:nvGrpSpPr>
+      <p:grpSpPr>
+        <a:xfrm>
+          <a:off x="0" y="0"/>
+          <a:ext cx="0" cy="0"/>
+          <a:chOff x="0" y="0"/>
+          <a:chExt cx="0" cy="0"/>
+        </a:xfrm>
+      </p:grpSpPr>
+      <p:sp>
+        <p:nvSpPr>
+          <p:cNvPr id="2" name="Slide Image Placeholder 1"/>
+          <p:cNvSpPr>
+            <a:spLocks noGrp="1" noRot="1" noChangeAspect="1"/>
+          </p:cNvSpPr>
+          <p:nvPr>
+            <p:ph type="sldImg"/>
+          </p:nvPr>
+        </p:nvSpPr>
+        <p:spPr/>
+      </p:sp>
+      <p:sp>
+        <p:nvSpPr>
+          <p:cNvPr id="3" name="Notes Placeholder 2"/>
+          <p:cNvSpPr>
+            <a:spLocks noGrp="1"/>
+          </p:cNvSpPr>
+          <p:nvPr>
+            <p:ph type="body" idx="1"/>
+          </p:nvPr>
+        </p:nvSpPr>
+        <p:spPr/>
+        <p:txBody>
+          <a:bodyPr/>
+          <a:lstStyle/>
+          <a:p>
+            <a:pPr marL="0" marR="0" lvl="0" indent="0" algn="l" defTabSz="914400" rtl="0" eaLnBrk="1" fontAlgn="auto" latinLnBrk="0" hangingPunct="1">
+              <a:lnSpc>
+                <a:spcPct val="100000"/>
+              </a:lnSpc>
+              <a:spcBef>
+                <a:spcPts val="0"/>
+              </a:spcBef>
+              <a:spcAft>
+                <a:spcPts val="0"/>
+              </a:spcAft>
+              <a:buClrTx/>
+              <a:buSzTx/>
+              <a:buFontTx/>
+              <a:buNone/>
+              <a:tabLst/>
+              <a:defRPr/>
+            </a:pPr>
+            <a:r>
+              <a:rPr lang="en-GB" sz="1200" u="sng" kern="1200" dirty="0" smtClean="0">
+                <a:solidFill>
+                  <a:schemeClr val="tx1"/>
+                </a:solidFill>
+                <a:latin typeface="+mn-lt"/>
+                <a:ea typeface="+mn-ea"/>
+                <a:cs typeface="+mn-cs"/>
+              </a:rPr>
+              <a:t>GenericMethodsExample1.java </a:t>
+            </a:r>
+            <a:r>
+              <a:rPr lang="en-GB" sz="1200" u="none" kern="1200" dirty="0" smtClean="0">
+                <a:solidFill>
+                  <a:schemeClr val="tx1"/>
+                </a:solidFill>
+                <a:latin typeface="+mn-lt"/>
+                <a:ea typeface="+mn-ea"/>
+                <a:cs typeface="+mn-cs"/>
+              </a:rPr>
+              <a:t>  </a:t>
+            </a:r>
+            <a:r>
+              <a:rPr lang="en-GB" sz="1200" b="1" u="none" kern="1200" dirty="0" smtClean="0">
+                <a:solidFill>
+                  <a:schemeClr val="tx1"/>
+                </a:solidFill>
+                <a:latin typeface="+mn-lt"/>
+                <a:ea typeface="+mn-ea"/>
+                <a:cs typeface="+mn-cs"/>
+              </a:rPr>
+              <a:t>,</a:t>
+            </a:r>
+            <a:r>
+              <a:rPr lang="en-GB" sz="1200" kern="1200" dirty="0" smtClean="0">
+                <a:solidFill>
+                  <a:schemeClr val="tx1"/>
+                </a:solidFill>
+                <a:latin typeface="+mn-lt"/>
+                <a:ea typeface="+mn-ea"/>
+                <a:cs typeface="+mn-cs"/>
+              </a:rPr>
+              <a:t>  GenericStaticMethodsExample1.java</a:t>
+            </a:r>
+            <a:endParaRPr lang="en-GB" dirty="0" smtClean="0"/>
+          </a:p>
+        </p:txBody>
+      </p:sp>
+      <p:sp>
+        <p:nvSpPr>
+          <p:cNvPr id="4" name="Slide Number Placeholder 3"/>
+          <p:cNvSpPr>
+            <a:spLocks noGrp="1"/>
+          </p:cNvSpPr>
+          <p:nvPr>
+            <p:ph type="sldNum" sz="quarter" idx="10"/>
+          </p:nvPr>
+        </p:nvSpPr>
+        <p:spPr/>
+        <p:txBody>
+          <a:bodyPr/>
+          <a:lstStyle/>
+          <a:p>
+            <a:fld id="{EB8B6B8F-4498-4E9D-8DE1-125892E25737}" type="slidenum">
+              <a:rPr lang="en-IN" smtClean="0"/>
+              <a:t>17</a:t>
+            </a:fld>
+            <a:endParaRPr lang="en-IN"/>
+          </a:p>
+        </p:txBody>
+      </p:sp>
+    </p:spTree>
+    <p:extLst>
+      <p:ext uri="{BB962C8B-B14F-4D97-AF65-F5344CB8AC3E}">
+        <p14:creationId xmlns:p14="http://schemas.microsoft.com/office/powerpoint/2010/main" val="3480737708"/>
       </p:ext>
     </p:extLst>
   </p:cSld>
@@ -1057,7 +1683,7 @@
           <a:p>
             <a:fld id="{D4BA8270-C9CF-44CA-BE5A-02C2BDCCEDE4}" type="datetimeFigureOut">
               <a:rPr lang="en-GB" smtClean="0"/>
-              <a:t>11/04/2020</a:t>
+              <a:t>12/04/2020</a:t>
             </a:fld>
             <a:endParaRPr lang="en-GB"/>
           </a:p>
@@ -1332,7 +1958,7 @@
           <a:p>
             <a:fld id="{D4BA8270-C9CF-44CA-BE5A-02C2BDCCEDE4}" type="datetimeFigureOut">
               <a:rPr lang="en-GB" smtClean="0"/>
-              <a:t>11/04/2020</a:t>
+              <a:t>12/04/2020</a:t>
             </a:fld>
             <a:endParaRPr lang="en-GB"/>
           </a:p>
@@ -1526,7 +2152,7 @@
           <a:p>
             <a:fld id="{D4BA8270-C9CF-44CA-BE5A-02C2BDCCEDE4}" type="datetimeFigureOut">
               <a:rPr lang="en-GB" smtClean="0"/>
-              <a:t>11/04/2020</a:t>
+              <a:t>12/04/2020</a:t>
             </a:fld>
             <a:endParaRPr lang="en-GB"/>
           </a:p>
@@ -1799,7 +2425,7 @@
           <a:p>
             <a:fld id="{D4BA8270-C9CF-44CA-BE5A-02C2BDCCEDE4}" type="datetimeFigureOut">
               <a:rPr lang="en-GB" smtClean="0"/>
-              <a:t>11/04/2020</a:t>
+              <a:t>12/04/2020</a:t>
             </a:fld>
             <a:endParaRPr lang="en-GB"/>
           </a:p>
@@ -2140,7 +2766,7 @@
           <a:p>
             <a:fld id="{D4BA8270-C9CF-44CA-BE5A-02C2BDCCEDE4}" type="datetimeFigureOut">
               <a:rPr lang="en-GB" smtClean="0"/>
-              <a:t>11/04/2020</a:t>
+              <a:t>12/04/2020</a:t>
             </a:fld>
             <a:endParaRPr lang="en-GB"/>
           </a:p>
@@ -2763,7 +3389,7 @@
           <a:p>
             <a:fld id="{D4BA8270-C9CF-44CA-BE5A-02C2BDCCEDE4}" type="datetimeFigureOut">
               <a:rPr lang="en-GB" smtClean="0"/>
-              <a:t>11/04/2020</a:t>
+              <a:t>12/04/2020</a:t>
             </a:fld>
             <a:endParaRPr lang="en-GB"/>
           </a:p>
@@ -3623,7 +4249,7 @@
           <a:p>
             <a:fld id="{D4BA8270-C9CF-44CA-BE5A-02C2BDCCEDE4}" type="datetimeFigureOut">
               <a:rPr lang="en-GB" smtClean="0"/>
-              <a:t>11/04/2020</a:t>
+              <a:t>12/04/2020</a:t>
             </a:fld>
             <a:endParaRPr lang="en-GB"/>
           </a:p>
@@ -3793,7 +4419,7 @@
           <a:p>
             <a:fld id="{D4BA8270-C9CF-44CA-BE5A-02C2BDCCEDE4}" type="datetimeFigureOut">
               <a:rPr lang="en-GB" smtClean="0"/>
-              <a:t>11/04/2020</a:t>
+              <a:t>12/04/2020</a:t>
             </a:fld>
             <a:endParaRPr lang="en-GB"/>
           </a:p>
@@ -3973,7 +4599,7 @@
           <a:p>
             <a:fld id="{D4BA8270-C9CF-44CA-BE5A-02C2BDCCEDE4}" type="datetimeFigureOut">
               <a:rPr lang="en-GB" smtClean="0"/>
-              <a:t>11/04/2020</a:t>
+              <a:t>12/04/2020</a:t>
             </a:fld>
             <a:endParaRPr lang="en-GB"/>
           </a:p>
@@ -4143,7 +4769,7 @@
           <a:p>
             <a:fld id="{D4BA8270-C9CF-44CA-BE5A-02C2BDCCEDE4}" type="datetimeFigureOut">
               <a:rPr lang="en-GB" smtClean="0"/>
-              <a:t>11/04/2020</a:t>
+              <a:t>12/04/2020</a:t>
             </a:fld>
             <a:endParaRPr lang="en-GB"/>
           </a:p>
@@ -4390,7 +5016,7 @@
           <a:p>
             <a:fld id="{D4BA8270-C9CF-44CA-BE5A-02C2BDCCEDE4}" type="datetimeFigureOut">
               <a:rPr lang="en-GB" smtClean="0"/>
-              <a:t>11/04/2020</a:t>
+              <a:t>12/04/2020</a:t>
             </a:fld>
             <a:endParaRPr lang="en-GB"/>
           </a:p>
@@ -4682,7 +5308,7 @@
           <a:p>
             <a:fld id="{D4BA8270-C9CF-44CA-BE5A-02C2BDCCEDE4}" type="datetimeFigureOut">
               <a:rPr lang="en-GB" smtClean="0"/>
-              <a:t>11/04/2020</a:t>
+              <a:t>12/04/2020</a:t>
             </a:fld>
             <a:endParaRPr lang="en-GB"/>
           </a:p>
@@ -5126,7 +5752,7 @@
           <a:p>
             <a:fld id="{D4BA8270-C9CF-44CA-BE5A-02C2BDCCEDE4}" type="datetimeFigureOut">
               <a:rPr lang="en-GB" smtClean="0"/>
-              <a:t>11/04/2020</a:t>
+              <a:t>12/04/2020</a:t>
             </a:fld>
             <a:endParaRPr lang="en-GB"/>
           </a:p>
@@ -5244,7 +5870,7 @@
           <a:p>
             <a:fld id="{D4BA8270-C9CF-44CA-BE5A-02C2BDCCEDE4}" type="datetimeFigureOut">
               <a:rPr lang="en-GB" smtClean="0"/>
-              <a:t>11/04/2020</a:t>
+              <a:t>12/04/2020</a:t>
             </a:fld>
             <a:endParaRPr lang="en-GB"/>
           </a:p>
@@ -5339,7 +5965,7 @@
           <a:p>
             <a:fld id="{D4BA8270-C9CF-44CA-BE5A-02C2BDCCEDE4}" type="datetimeFigureOut">
               <a:rPr lang="en-GB" smtClean="0"/>
-              <a:t>11/04/2020</a:t>
+              <a:t>12/04/2020</a:t>
             </a:fld>
             <a:endParaRPr lang="en-GB"/>
           </a:p>
@@ -5618,7 +6244,7 @@
           <a:p>
             <a:fld id="{D4BA8270-C9CF-44CA-BE5A-02C2BDCCEDE4}" type="datetimeFigureOut">
               <a:rPr lang="en-GB" smtClean="0"/>
-              <a:t>11/04/2020</a:t>
+              <a:t>12/04/2020</a:t>
             </a:fld>
             <a:endParaRPr lang="en-GB"/>
           </a:p>
@@ -5893,7 +6519,7 @@
           <a:p>
             <a:fld id="{D4BA8270-C9CF-44CA-BE5A-02C2BDCCEDE4}" type="datetimeFigureOut">
               <a:rPr lang="en-GB" smtClean="0"/>
-              <a:t>11/04/2020</a:t>
+              <a:t>12/04/2020</a:t>
             </a:fld>
             <a:endParaRPr lang="en-GB"/>
           </a:p>
@@ -6322,7 +6948,7 @@
           <a:p>
             <a:fld id="{D4BA8270-C9CF-44CA-BE5A-02C2BDCCEDE4}" type="datetimeFigureOut">
               <a:rPr lang="en-GB" smtClean="0"/>
-              <a:t>11/04/2020</a:t>
+              <a:t>12/04/2020</a:t>
             </a:fld>
             <a:endParaRPr lang="en-GB"/>
           </a:p>
@@ -7480,6 +8106,533 @@
           <a:lstStyle/>
           <a:p>
             <a:r>
+              <a:rPr lang="en-GB" dirty="0" smtClean="0"/>
+              <a:t>Generic Classes </a:t>
+            </a:r>
+            <a:r>
+              <a:rPr lang="en-GB" dirty="0" err="1" smtClean="0"/>
+              <a:t>Cont</a:t>
+            </a:r>
+            <a:r>
+              <a:rPr lang="en-GB" dirty="0" smtClean="0"/>
+              <a:t>…</a:t>
+            </a:r>
+            <a:endParaRPr lang="en-GB" dirty="0"/>
+          </a:p>
+        </p:txBody>
+      </p:sp>
+      <p:sp>
+        <p:nvSpPr>
+          <p:cNvPr id="3" name="Content Placeholder 2"/>
+          <p:cNvSpPr>
+            <a:spLocks noGrp="1"/>
+          </p:cNvSpPr>
+          <p:nvPr>
+            <p:ph idx="1"/>
+          </p:nvPr>
+        </p:nvSpPr>
+        <p:spPr>
+          <a:xfrm>
+            <a:off x="513432" y="803514"/>
+            <a:ext cx="10085916" cy="5605912"/>
+          </a:xfrm>
+        </p:spPr>
+        <p:txBody>
+          <a:bodyPr>
+            <a:normAutofit fontScale="92500" lnSpcReduction="20000"/>
+          </a:bodyPr>
+          <a:lstStyle/>
+          <a:p>
+            <a:pPr marL="285750" indent="-285750">
+              <a:lnSpc>
+                <a:spcPct val="150000"/>
+              </a:lnSpc>
+              <a:buFont typeface="Wingdings" panose="05000000000000000000" pitchFamily="2" charset="2"/>
+              <a:buChar char="Ø"/>
+            </a:pPr>
+            <a:r>
+              <a:rPr lang="en-US" altLang="en-US" sz="1400" b="1" dirty="0" smtClean="0"/>
+              <a:t>I</a:t>
+            </a:r>
+            <a:r>
+              <a:rPr lang="en-US" altLang="en-US" sz="1400" b="1" dirty="0" smtClean="0" bmk=""/>
+              <a:t>nvoking </a:t>
+            </a:r>
+            <a:r>
+              <a:rPr lang="en-US" altLang="en-US" sz="1400" b="1" dirty="0" bmk=""/>
+              <a:t>and Instantiating a Generic </a:t>
+            </a:r>
+            <a:r>
+              <a:rPr lang="en-US" altLang="en-US" sz="1400" b="1" dirty="0" smtClean="0" bmk=""/>
+              <a:t>Type</a:t>
+            </a:r>
+          </a:p>
+          <a:p>
+            <a:pPr marL="285750" indent="-285750">
+              <a:lnSpc>
+                <a:spcPct val="150000"/>
+              </a:lnSpc>
+              <a:buFont typeface="Wingdings" panose="05000000000000000000" pitchFamily="2" charset="2"/>
+              <a:buChar char="Ø"/>
+            </a:pPr>
+            <a:r>
+              <a:rPr lang="en-US" altLang="en-US" sz="1400" dirty="0" smtClean="0"/>
+              <a:t>To </a:t>
+            </a:r>
+            <a:r>
+              <a:rPr lang="en-US" altLang="en-US" sz="1400" dirty="0"/>
+              <a:t>reference the generic Box class from within your code, you must perform a generic type invocation, </a:t>
+            </a:r>
+          </a:p>
+          <a:p>
+            <a:pPr marL="0" lvl="0" indent="0" defTabSz="914400" eaLnBrk="0" fontAlgn="base" hangingPunct="0">
+              <a:spcBef>
+                <a:spcPct val="0"/>
+              </a:spcBef>
+              <a:spcAft>
+                <a:spcPct val="0"/>
+              </a:spcAft>
+              <a:buClrTx/>
+              <a:buSzTx/>
+              <a:buNone/>
+            </a:pPr>
+            <a:r>
+              <a:rPr lang="en-US" altLang="en-US" sz="1400" dirty="0" smtClean="0"/>
+              <a:t>      which </a:t>
+            </a:r>
+            <a:r>
+              <a:rPr lang="en-US" altLang="en-US" sz="1400" dirty="0"/>
+              <a:t>replaces T with some concrete value, such as </a:t>
+            </a:r>
+            <a:r>
+              <a:rPr lang="en-US" altLang="en-US" sz="1400" dirty="0" smtClean="0"/>
+              <a:t>Integer:</a:t>
+            </a:r>
+          </a:p>
+          <a:p>
+            <a:pPr marL="685800" lvl="1" fontAlgn="base">
+              <a:lnSpc>
+                <a:spcPct val="150000"/>
+              </a:lnSpc>
+              <a:buFont typeface="Wingdings" panose="05000000000000000000" pitchFamily="2" charset="2"/>
+              <a:buChar char="Ø"/>
+            </a:pPr>
+            <a:r>
+              <a:rPr lang="en-US" altLang="en-US" sz="1400" dirty="0"/>
+              <a:t>Box&lt;Integer&gt; </a:t>
+            </a:r>
+            <a:r>
+              <a:rPr lang="en-US" altLang="en-US" sz="1400" dirty="0" err="1"/>
+              <a:t>integerBox</a:t>
+            </a:r>
+            <a:r>
+              <a:rPr lang="en-US" altLang="en-US" sz="1400" dirty="0"/>
+              <a:t>; </a:t>
+            </a:r>
+          </a:p>
+          <a:p>
+            <a:pPr marL="285750" fontAlgn="base">
+              <a:lnSpc>
+                <a:spcPct val="150000"/>
+              </a:lnSpc>
+              <a:buFont typeface="Wingdings" panose="05000000000000000000" pitchFamily="2" charset="2"/>
+              <a:buChar char="Ø"/>
+            </a:pPr>
+            <a:r>
+              <a:rPr lang="en-US" altLang="en-US" sz="1400" dirty="0"/>
+              <a:t>You can think of a generic type invocation as being similar to an ordinary method invocation</a:t>
+            </a:r>
+            <a:r>
+              <a:rPr lang="en-US" altLang="en-US" sz="1400" dirty="0" smtClean="0"/>
+              <a:t>, but </a:t>
+            </a:r>
+            <a:r>
+              <a:rPr lang="en-US" altLang="en-US" sz="1400" dirty="0"/>
+              <a:t>instead of passing an argument to a method, you are passing a type argument — Integer in this case — to  </a:t>
+            </a:r>
+            <a:r>
+              <a:rPr lang="en-US" altLang="en-US" sz="1400" dirty="0" smtClean="0"/>
+              <a:t>the</a:t>
+            </a:r>
+            <a:r>
+              <a:rPr lang="en-US" altLang="en-US" sz="1400" dirty="0"/>
+              <a:t> Box class </a:t>
+            </a:r>
+            <a:r>
+              <a:rPr lang="en-US" altLang="en-US" sz="1400" dirty="0" smtClean="0"/>
+              <a:t>itself.</a:t>
+            </a:r>
+          </a:p>
+          <a:p>
+            <a:pPr marL="285750" indent="-285750">
+              <a:lnSpc>
+                <a:spcPct val="150000"/>
+              </a:lnSpc>
+              <a:buFont typeface="Wingdings" panose="05000000000000000000" pitchFamily="2" charset="2"/>
+              <a:buChar char="Ø"/>
+            </a:pPr>
+            <a:r>
+              <a:rPr lang="en-US" altLang="en-US" sz="1400" b="1" dirty="0"/>
+              <a:t>The </a:t>
+            </a:r>
+            <a:r>
+              <a:rPr lang="en-US" altLang="en-US" sz="1400" b="1" dirty="0" smtClean="0"/>
+              <a:t>Diamond</a:t>
+            </a:r>
+          </a:p>
+          <a:p>
+            <a:pPr marL="285750" indent="-285750">
+              <a:lnSpc>
+                <a:spcPct val="150000"/>
+              </a:lnSpc>
+              <a:buFont typeface="Wingdings" panose="05000000000000000000" pitchFamily="2" charset="2"/>
+              <a:buChar char="Ø"/>
+            </a:pPr>
+            <a:r>
+              <a:rPr lang="en-US" altLang="en-US" sz="1400" dirty="0" smtClean="0"/>
+              <a:t>In </a:t>
+            </a:r>
+            <a:r>
+              <a:rPr lang="en-US" altLang="en-US" sz="1400" dirty="0"/>
+              <a:t>Java SE 7 and later, you can replace the type arguments required to invoke the constructor of a generic class with an empty set of type arguments (&lt;&gt;) as long as the compiler can determine, or infer, the type arguments from the context. This pair of angle brackets, &lt;&gt;, is informally called the diamond. For example, you can create an instance of Box&lt;Integer&gt; with the following statement </a:t>
+            </a:r>
+          </a:p>
+          <a:p>
+            <a:pPr marL="685800" lvl="1" fontAlgn="base">
+              <a:lnSpc>
+                <a:spcPct val="150000"/>
+              </a:lnSpc>
+              <a:buFont typeface="Wingdings" panose="05000000000000000000" pitchFamily="2" charset="2"/>
+              <a:buChar char="Ø"/>
+            </a:pPr>
+            <a:r>
+              <a:rPr lang="en-US" altLang="en-US" sz="1400" dirty="0"/>
+              <a:t>Box&lt;Integer&gt; </a:t>
+            </a:r>
+            <a:r>
+              <a:rPr lang="en-US" altLang="en-US" sz="1400" dirty="0" err="1"/>
+              <a:t>integerBox</a:t>
+            </a:r>
+            <a:r>
+              <a:rPr lang="en-US" altLang="en-US" sz="1400" dirty="0"/>
+              <a:t> = new Box&lt;&gt;();</a:t>
+            </a:r>
+          </a:p>
+          <a:p>
+            <a:pPr marL="285750" fontAlgn="base">
+              <a:lnSpc>
+                <a:spcPct val="150000"/>
+              </a:lnSpc>
+              <a:buFont typeface="Wingdings" panose="05000000000000000000" pitchFamily="2" charset="2"/>
+              <a:buChar char="Ø"/>
+            </a:pPr>
+            <a:r>
+              <a:rPr lang="en-US" altLang="en-US" sz="1400" dirty="0"/>
+              <a:t> Because a Java compiler can infer </a:t>
+            </a:r>
+            <a:r>
+              <a:rPr lang="en-US" altLang="en-US" sz="1400" dirty="0" smtClean="0"/>
+              <a:t>the</a:t>
+            </a:r>
+            <a:r>
+              <a:rPr lang="en-US" altLang="en-US" sz="1400" dirty="0"/>
+              <a:t> types from the declaration  Box&lt;Integer&gt; </a:t>
+            </a:r>
+            <a:r>
+              <a:rPr lang="en-US" altLang="en-US" sz="1400" dirty="0" smtClean="0"/>
+              <a:t>, the </a:t>
+            </a:r>
+            <a:r>
+              <a:rPr lang="en-US" altLang="en-US" sz="1400" dirty="0" smtClean="0"/>
+              <a:t>instantiation </a:t>
+            </a:r>
+            <a:r>
+              <a:rPr lang="en-US" altLang="en-US" sz="1400" dirty="0"/>
+              <a:t>statements can be </a:t>
+            </a:r>
+            <a:r>
+              <a:rPr lang="en-US" altLang="en-US" sz="1400" dirty="0" smtClean="0"/>
+              <a:t>   shortened </a:t>
+            </a:r>
+            <a:r>
+              <a:rPr lang="en-US" altLang="en-US" sz="1400" dirty="0"/>
+              <a:t>using diamond </a:t>
+            </a:r>
+            <a:r>
+              <a:rPr lang="en-US" altLang="en-US" sz="1400" dirty="0" smtClean="0"/>
+              <a:t>notation</a:t>
+            </a:r>
+            <a:r>
+              <a:rPr lang="en-US" altLang="en-US" sz="1400" dirty="0"/>
+              <a:t> </a:t>
+            </a:r>
+            <a:r>
+              <a:rPr lang="en-US" altLang="en-US" sz="1400" dirty="0" smtClean="0"/>
+              <a:t>and we do not need to specify type in </a:t>
+            </a:r>
+            <a:r>
+              <a:rPr lang="en-US" altLang="en-US" sz="1400" dirty="0"/>
+              <a:t>new Box</a:t>
+            </a:r>
+            <a:r>
+              <a:rPr lang="en-US" altLang="en-US" sz="1400" dirty="0" smtClean="0"/>
+              <a:t>&lt;&gt;();</a:t>
+            </a:r>
+          </a:p>
+          <a:p>
+            <a:pPr marL="285750" fontAlgn="base">
+              <a:lnSpc>
+                <a:spcPct val="150000"/>
+              </a:lnSpc>
+              <a:buFont typeface="Wingdings" panose="05000000000000000000" pitchFamily="2" charset="2"/>
+              <a:buChar char="Ø"/>
+            </a:pPr>
+            <a:r>
+              <a:rPr lang="en-US" altLang="en-US" sz="1400" dirty="0"/>
+              <a:t>You can also substitute a type parameter (i.e., K or V) with a parameterized type (i.e., List&lt;String&gt;). For example, using the </a:t>
+            </a:r>
+            <a:r>
+              <a:rPr lang="en-US" altLang="en-US" sz="1400" dirty="0" err="1"/>
+              <a:t>OrderedPair</a:t>
+            </a:r>
+            <a:r>
+              <a:rPr lang="en-US" altLang="en-US" sz="1400" dirty="0"/>
+              <a:t>&lt;K, V&gt; example</a:t>
+            </a:r>
+          </a:p>
+          <a:p>
+            <a:pPr marL="685800" lvl="1" fontAlgn="base">
+              <a:lnSpc>
+                <a:spcPct val="150000"/>
+              </a:lnSpc>
+              <a:buFont typeface="Wingdings" panose="05000000000000000000" pitchFamily="2" charset="2"/>
+              <a:buChar char="Ø"/>
+            </a:pPr>
+            <a:r>
+              <a:rPr lang="en-US" altLang="en-US" sz="1400" dirty="0" err="1"/>
+              <a:t>OrderedPair</a:t>
+            </a:r>
+            <a:r>
+              <a:rPr lang="en-US" altLang="en-US" sz="1400" dirty="0"/>
+              <a:t>&lt;String, Box&lt;Integer&gt;&gt; p = new </a:t>
+            </a:r>
+            <a:r>
+              <a:rPr lang="en-US" altLang="en-US" sz="1400" dirty="0" err="1"/>
+              <a:t>OrderedPair</a:t>
+            </a:r>
+            <a:r>
+              <a:rPr lang="en-US" altLang="en-US" sz="1400" dirty="0"/>
+              <a:t>&lt;&gt;("primes", new Box&lt;Integer&gt;(...)); </a:t>
+            </a:r>
+          </a:p>
+          <a:p>
+            <a:pPr marL="400050" lvl="1" indent="0" fontAlgn="base">
+              <a:lnSpc>
+                <a:spcPct val="150000"/>
+              </a:lnSpc>
+              <a:buNone/>
+            </a:pPr>
+            <a:endParaRPr lang="en-US" altLang="en-US" sz="1200" dirty="0"/>
+          </a:p>
+          <a:p>
+            <a:pPr marL="285750" fontAlgn="base">
+              <a:lnSpc>
+                <a:spcPct val="150000"/>
+              </a:lnSpc>
+              <a:buFont typeface="Wingdings" panose="05000000000000000000" pitchFamily="2" charset="2"/>
+              <a:buChar char="Ø"/>
+            </a:pPr>
+            <a:endParaRPr lang="en-US" altLang="en-US" sz="1400" dirty="0"/>
+          </a:p>
+        </p:txBody>
+      </p:sp>
+    </p:spTree>
+    <p:extLst>
+      <p:ext uri="{BB962C8B-B14F-4D97-AF65-F5344CB8AC3E}">
+        <p14:creationId xmlns:p14="http://schemas.microsoft.com/office/powerpoint/2010/main" val="2790138978"/>
+      </p:ext>
+    </p:extLst>
+  </p:cSld>
+  <p:clrMapOvr>
+    <a:masterClrMapping/>
+  </p:clrMapOvr>
+  <p:timing>
+    <p:tnLst>
+      <p:par>
+        <p:cTn id="1" dur="indefinite" restart="never" nodeType="tmRoot"/>
+      </p:par>
+    </p:tnLst>
+  </p:timing>
+</p:sld>
+</file>
+
+<file path=ppt/slides/slide14.xml><?xml version="1.0" encoding="utf-8"?>
+<p:sld xmlns:a="http://schemas.openxmlformats.org/drawingml/2006/main" xmlns:r="http://schemas.openxmlformats.org/officeDocument/2006/relationships" xmlns:p="http://schemas.openxmlformats.org/presentationml/2006/main">
+  <p:cSld>
+    <p:spTree>
+      <p:nvGrpSpPr>
+        <p:cNvPr id="1" name=""/>
+        <p:cNvGrpSpPr/>
+        <p:nvPr/>
+      </p:nvGrpSpPr>
+      <p:grpSpPr>
+        <a:xfrm>
+          <a:off x="0" y="0"/>
+          <a:ext cx="0" cy="0"/>
+          <a:chOff x="0" y="0"/>
+          <a:chExt cx="0" cy="0"/>
+        </a:xfrm>
+      </p:grpSpPr>
+      <p:sp>
+        <p:nvSpPr>
+          <p:cNvPr id="2" name="Title 1"/>
+          <p:cNvSpPr>
+            <a:spLocks noGrp="1"/>
+          </p:cNvSpPr>
+          <p:nvPr>
+            <p:ph type="title"/>
+          </p:nvPr>
+        </p:nvSpPr>
+        <p:spPr>
+          <a:xfrm>
+            <a:off x="513432" y="0"/>
+            <a:ext cx="8596668" cy="503208"/>
+          </a:xfrm>
+        </p:spPr>
+        <p:txBody>
+          <a:bodyPr>
+            <a:normAutofit fontScale="90000"/>
+          </a:bodyPr>
+          <a:lstStyle/>
+          <a:p>
+            <a:r>
+              <a:rPr lang="en-GB" dirty="0"/>
+              <a:t>Generic </a:t>
+            </a:r>
+            <a:r>
+              <a:rPr lang="en-GB" dirty="0" smtClean="0"/>
+              <a:t>Classes </a:t>
+            </a:r>
+            <a:r>
+              <a:rPr lang="en-GB" dirty="0" err="1" smtClean="0"/>
+              <a:t>Cont</a:t>
+            </a:r>
+            <a:r>
+              <a:rPr lang="en-GB" dirty="0" smtClean="0"/>
+              <a:t>…</a:t>
+            </a:r>
+            <a:endParaRPr lang="en-GB" dirty="0"/>
+          </a:p>
+        </p:txBody>
+      </p:sp>
+      <p:sp>
+        <p:nvSpPr>
+          <p:cNvPr id="3" name="Content Placeholder 2"/>
+          <p:cNvSpPr>
+            <a:spLocks noGrp="1"/>
+          </p:cNvSpPr>
+          <p:nvPr>
+            <p:ph idx="1"/>
+          </p:nvPr>
+        </p:nvSpPr>
+        <p:spPr>
+          <a:xfrm>
+            <a:off x="677334" y="646981"/>
+            <a:ext cx="10085916" cy="5394381"/>
+          </a:xfrm>
+        </p:spPr>
+        <p:txBody>
+          <a:bodyPr/>
+          <a:lstStyle/>
+          <a:p>
+            <a:endParaRPr lang="en-GB" dirty="0"/>
+          </a:p>
+        </p:txBody>
+      </p:sp>
+      <p:pic>
+        <p:nvPicPr>
+          <p:cNvPr id="5" name="Picture 4"/>
+          <p:cNvPicPr>
+            <a:picLocks noChangeAspect="1"/>
+          </p:cNvPicPr>
+          <p:nvPr/>
+        </p:nvPicPr>
+        <p:blipFill>
+          <a:blip r:embed="rId2"/>
+          <a:stretch>
+            <a:fillRect/>
+          </a:stretch>
+        </p:blipFill>
+        <p:spPr>
+          <a:xfrm>
+            <a:off x="677334" y="646981"/>
+            <a:ext cx="9983065" cy="6211019"/>
+          </a:xfrm>
+          <a:prstGeom prst="rect">
+            <a:avLst/>
+          </a:prstGeom>
+        </p:spPr>
+      </p:pic>
+    </p:spTree>
+    <p:extLst>
+      <p:ext uri="{BB962C8B-B14F-4D97-AF65-F5344CB8AC3E}">
+        <p14:creationId xmlns:p14="http://schemas.microsoft.com/office/powerpoint/2010/main" val="3213219512"/>
+      </p:ext>
+    </p:extLst>
+  </p:cSld>
+  <p:clrMapOvr>
+    <a:masterClrMapping/>
+  </p:clrMapOvr>
+  <p:timing>
+    <p:tnLst>
+      <p:par>
+        <p:cTn id="1" dur="indefinite" restart="never" nodeType="tmRoot"/>
+      </p:par>
+    </p:tnLst>
+  </p:timing>
+</p:sld>
+</file>
+
+<file path=ppt/slides/slide15.xml><?xml version="1.0" encoding="utf-8"?>
+<p:sld xmlns:a="http://schemas.openxmlformats.org/drawingml/2006/main" xmlns:r="http://schemas.openxmlformats.org/officeDocument/2006/relationships" xmlns:p="http://schemas.openxmlformats.org/presentationml/2006/main">
+  <p:cSld>
+    <p:spTree>
+      <p:nvGrpSpPr>
+        <p:cNvPr id="1" name=""/>
+        <p:cNvGrpSpPr/>
+        <p:nvPr/>
+      </p:nvGrpSpPr>
+      <p:grpSpPr>
+        <a:xfrm>
+          <a:off x="0" y="0"/>
+          <a:ext cx="0" cy="0"/>
+          <a:chOff x="0" y="0"/>
+          <a:chExt cx="0" cy="0"/>
+        </a:xfrm>
+      </p:grpSpPr>
+      <p:sp>
+        <p:nvSpPr>
+          <p:cNvPr id="2" name="Title 1"/>
+          <p:cNvSpPr>
+            <a:spLocks noGrp="1"/>
+          </p:cNvSpPr>
+          <p:nvPr>
+            <p:ph type="title"/>
+          </p:nvPr>
+        </p:nvSpPr>
+        <p:spPr>
+          <a:xfrm>
+            <a:off x="513432" y="0"/>
+            <a:ext cx="8596668" cy="503208"/>
+          </a:xfrm>
+        </p:spPr>
+        <p:txBody>
+          <a:bodyPr>
+            <a:normAutofit fontScale="90000"/>
+          </a:bodyPr>
+          <a:lstStyle/>
+          <a:p>
+            <a:r>
               <a:rPr lang="en-GB" dirty="0"/>
               <a:t>Generic </a:t>
             </a:r>
@@ -7587,7 +8740,11 @@
             </a:pPr>
             <a:r>
               <a:rPr lang="en-IN" sz="1400" dirty="0"/>
-              <a:t>For example public &lt;T&gt;void m1(T t), public &lt;T extends Number&gt;void m1(T t), public &lt;T extends Runnable&gt;void m1(T t), public &lt;T extends Number &amp; Runnable&gt;void m1(T t), public &lt;T extends Runnable &amp; Comparable&gt;void m1(T t)</a:t>
+              <a:t>For example public &lt;T&gt;void m1(T </a:t>
+            </a:r>
+            <a:r>
+              <a:rPr lang="en-IN" sz="1400" dirty="0" smtClean="0"/>
+              <a:t>t)</a:t>
             </a:r>
           </a:p>
           <a:p>
@@ -7599,8 +8756,12 @@
               <a:buChar char="Ø"/>
             </a:pPr>
             <a:r>
+              <a:rPr lang="en-IN" sz="1400" dirty="0" smtClean="0"/>
+              <a:t>Now </a:t>
+            </a:r>
+            <a:r>
               <a:rPr lang="en-IN" sz="1400" dirty="0"/>
-              <a:t>Now we can use this anywhere within the method</a:t>
+              <a:t>we can use this anywhere within the method</a:t>
             </a:r>
             <a:r>
               <a:rPr lang="en-IN" sz="1400" dirty="0" smtClean="0"/>
@@ -7639,7 +8800,7 @@
 </p:sld>
 </file>
 
-<file path=ppt/slides/slide14.xml><?xml version="1.0" encoding="utf-8"?>
+<file path=ppt/slides/slide16.xml><?xml version="1.0" encoding="utf-8"?>
 <p:sld xmlns:a="http://schemas.openxmlformats.org/drawingml/2006/main" xmlns:r="http://schemas.openxmlformats.org/officeDocument/2006/relationships" xmlns:p="http://schemas.openxmlformats.org/presentationml/2006/main">
   <p:cSld>
     <p:spTree>
@@ -8401,7 +9562,7 @@
 </p:sld>
 </file>
 
-<file path=ppt/slides/slide15.xml><?xml version="1.0" encoding="utf-8"?>
+<file path=ppt/slides/slide17.xml><?xml version="1.0" encoding="utf-8"?>
 <p:sld xmlns:a="http://schemas.openxmlformats.org/drawingml/2006/main" xmlns:r="http://schemas.openxmlformats.org/officeDocument/2006/relationships" xmlns:p="http://schemas.openxmlformats.org/presentationml/2006/main">
   <p:cSld>
     <p:spTree>
@@ -8924,567 +10085,6 @@
 </p:sld>
 </file>
 
-<file path=ppt/slides/slide16.xml><?xml version="1.0" encoding="utf-8"?>
-<p:sld xmlns:a="http://schemas.openxmlformats.org/drawingml/2006/main" xmlns:r="http://schemas.openxmlformats.org/officeDocument/2006/relationships" xmlns:p="http://schemas.openxmlformats.org/presentationml/2006/main">
-  <p:cSld>
-    <p:spTree>
-      <p:nvGrpSpPr>
-        <p:cNvPr id="1" name=""/>
-        <p:cNvGrpSpPr/>
-        <p:nvPr/>
-      </p:nvGrpSpPr>
-      <p:grpSpPr>
-        <a:xfrm>
-          <a:off x="0" y="0"/>
-          <a:ext cx="0" cy="0"/>
-          <a:chOff x="0" y="0"/>
-          <a:chExt cx="0" cy="0"/>
-        </a:xfrm>
-      </p:grpSpPr>
-      <p:sp>
-        <p:nvSpPr>
-          <p:cNvPr id="2" name="Title 1"/>
-          <p:cNvSpPr>
-            <a:spLocks noGrp="1"/>
-          </p:cNvSpPr>
-          <p:nvPr>
-            <p:ph type="title"/>
-          </p:nvPr>
-        </p:nvSpPr>
-        <p:spPr>
-          <a:xfrm>
-            <a:off x="513432" y="0"/>
-            <a:ext cx="8596668" cy="503208"/>
-          </a:xfrm>
-        </p:spPr>
-        <p:txBody>
-          <a:bodyPr>
-            <a:normAutofit fontScale="90000"/>
-          </a:bodyPr>
-          <a:lstStyle/>
-          <a:p>
-            <a:r>
-              <a:rPr lang="en-GB" dirty="0" smtClean="0"/>
-              <a:t>Generic Classes </a:t>
-            </a:r>
-            <a:r>
-              <a:rPr lang="en-GB" dirty="0" err="1" smtClean="0"/>
-              <a:t>Cont</a:t>
-            </a:r>
-            <a:r>
-              <a:rPr lang="en-GB" dirty="0" smtClean="0"/>
-              <a:t>…</a:t>
-            </a:r>
-            <a:endParaRPr lang="en-GB" dirty="0"/>
-          </a:p>
-        </p:txBody>
-      </p:sp>
-      <p:sp>
-        <p:nvSpPr>
-          <p:cNvPr id="3" name="Content Placeholder 2"/>
-          <p:cNvSpPr>
-            <a:spLocks noGrp="1"/>
-          </p:cNvSpPr>
-          <p:nvPr>
-            <p:ph idx="1"/>
-          </p:nvPr>
-        </p:nvSpPr>
-        <p:spPr>
-          <a:xfrm>
-            <a:off x="513432" y="803514"/>
-            <a:ext cx="10085916" cy="5605912"/>
-          </a:xfrm>
-        </p:spPr>
-        <p:txBody>
-          <a:bodyPr>
-            <a:normAutofit fontScale="92500" lnSpcReduction="20000"/>
-          </a:bodyPr>
-          <a:lstStyle/>
-          <a:p>
-            <a:pPr marL="285750" indent="-285750">
-              <a:lnSpc>
-                <a:spcPct val="150000"/>
-              </a:lnSpc>
-              <a:buFont typeface="Wingdings" panose="05000000000000000000" pitchFamily="2" charset="2"/>
-              <a:buChar char="Ø"/>
-            </a:pPr>
-            <a:r>
-              <a:rPr lang="en-US" altLang="en-US" sz="1400" b="1" dirty="0" smtClean="0"/>
-              <a:t>I</a:t>
-            </a:r>
-            <a:r>
-              <a:rPr lang="en-US" altLang="en-US" sz="1400" b="1" dirty="0" smtClean="0" bmk=""/>
-              <a:t>nvoking </a:t>
-            </a:r>
-            <a:r>
-              <a:rPr lang="en-US" altLang="en-US" sz="1400" b="1" dirty="0" bmk=""/>
-              <a:t>and Instantiating a Generic </a:t>
-            </a:r>
-            <a:r>
-              <a:rPr lang="en-US" altLang="en-US" sz="1400" b="1" dirty="0" smtClean="0" bmk=""/>
-              <a:t>Type</a:t>
-            </a:r>
-          </a:p>
-          <a:p>
-            <a:pPr marL="285750" indent="-285750">
-              <a:lnSpc>
-                <a:spcPct val="150000"/>
-              </a:lnSpc>
-              <a:buFont typeface="Wingdings" panose="05000000000000000000" pitchFamily="2" charset="2"/>
-              <a:buChar char="Ø"/>
-            </a:pPr>
-            <a:r>
-              <a:rPr lang="en-US" altLang="en-US" sz="1400" dirty="0" smtClean="0"/>
-              <a:t>To </a:t>
-            </a:r>
-            <a:r>
-              <a:rPr lang="en-US" altLang="en-US" sz="1400" dirty="0"/>
-              <a:t>reference the generic Box class from within your code, you must perform a generic type invocation, </a:t>
-            </a:r>
-          </a:p>
-          <a:p>
-            <a:pPr marL="0" lvl="0" indent="0" defTabSz="914400" eaLnBrk="0" fontAlgn="base" hangingPunct="0">
-              <a:spcBef>
-                <a:spcPct val="0"/>
-              </a:spcBef>
-              <a:spcAft>
-                <a:spcPct val="0"/>
-              </a:spcAft>
-              <a:buClrTx/>
-              <a:buSzTx/>
-              <a:buNone/>
-            </a:pPr>
-            <a:r>
-              <a:rPr lang="en-US" altLang="en-US" sz="1400" dirty="0" smtClean="0"/>
-              <a:t>      which </a:t>
-            </a:r>
-            <a:r>
-              <a:rPr lang="en-US" altLang="en-US" sz="1400" dirty="0"/>
-              <a:t>replaces T with some concrete value, such as </a:t>
-            </a:r>
-            <a:r>
-              <a:rPr lang="en-US" altLang="en-US" sz="1400" dirty="0" smtClean="0"/>
-              <a:t>Integer:</a:t>
-            </a:r>
-          </a:p>
-          <a:p>
-            <a:pPr marL="685800" lvl="1" fontAlgn="base">
-              <a:lnSpc>
-                <a:spcPct val="150000"/>
-              </a:lnSpc>
-              <a:buFont typeface="Wingdings" panose="05000000000000000000" pitchFamily="2" charset="2"/>
-              <a:buChar char="Ø"/>
-            </a:pPr>
-            <a:r>
-              <a:rPr lang="en-US" altLang="en-US" sz="1400" dirty="0"/>
-              <a:t>Box&lt;Integer</a:t>
-            </a:r>
-            <a:r>
-              <a:rPr lang="en-US" altLang="en-US" sz="1400" dirty="0"/>
-              <a:t>&gt; </a:t>
-            </a:r>
-            <a:r>
-              <a:rPr lang="en-US" altLang="en-US" sz="1400" dirty="0" err="1"/>
-              <a:t>integerBox</a:t>
-            </a:r>
-            <a:r>
-              <a:rPr lang="en-US" altLang="en-US" sz="1400" dirty="0"/>
-              <a:t>; </a:t>
-            </a:r>
-            <a:endParaRPr lang="en-US" altLang="en-US" sz="1400" dirty="0"/>
-          </a:p>
-          <a:p>
-            <a:pPr marL="285750" fontAlgn="base">
-              <a:lnSpc>
-                <a:spcPct val="150000"/>
-              </a:lnSpc>
-              <a:buFont typeface="Wingdings" panose="05000000000000000000" pitchFamily="2" charset="2"/>
-              <a:buChar char="Ø"/>
-            </a:pPr>
-            <a:r>
-              <a:rPr lang="en-US" altLang="en-US" sz="1400" dirty="0"/>
-              <a:t>You can think of a generic type invocation as being similar to an ordinary method invocation</a:t>
-            </a:r>
-            <a:r>
-              <a:rPr lang="en-US" altLang="en-US" sz="1400" dirty="0" smtClean="0"/>
-              <a:t>, but </a:t>
-            </a:r>
-            <a:r>
-              <a:rPr lang="en-US" altLang="en-US" sz="1400" dirty="0"/>
-              <a:t>instead of passing an argument to a method, you are passing a type argument — Integer in this case — to  </a:t>
-            </a:r>
-            <a:r>
-              <a:rPr lang="en-US" altLang="en-US" sz="1400" dirty="0" smtClean="0"/>
-              <a:t>the</a:t>
-            </a:r>
-            <a:r>
-              <a:rPr lang="en-US" altLang="en-US" sz="1400" dirty="0"/>
-              <a:t> Box class </a:t>
-            </a:r>
-            <a:r>
-              <a:rPr lang="en-US" altLang="en-US" sz="1400" dirty="0" smtClean="0"/>
-              <a:t>itself.</a:t>
-            </a:r>
-          </a:p>
-          <a:p>
-            <a:pPr marL="285750" indent="-285750">
-              <a:lnSpc>
-                <a:spcPct val="150000"/>
-              </a:lnSpc>
-              <a:buFont typeface="Wingdings" panose="05000000000000000000" pitchFamily="2" charset="2"/>
-              <a:buChar char="Ø"/>
-            </a:pPr>
-            <a:r>
-              <a:rPr lang="en-US" altLang="en-US" sz="1400" b="1" dirty="0"/>
-              <a:t>The </a:t>
-            </a:r>
-            <a:r>
-              <a:rPr lang="en-US" altLang="en-US" sz="1400" b="1" dirty="0" smtClean="0"/>
-              <a:t>Diamond</a:t>
-            </a:r>
-          </a:p>
-          <a:p>
-            <a:pPr marL="285750" indent="-285750">
-              <a:lnSpc>
-                <a:spcPct val="150000"/>
-              </a:lnSpc>
-              <a:buFont typeface="Wingdings" panose="05000000000000000000" pitchFamily="2" charset="2"/>
-              <a:buChar char="Ø"/>
-            </a:pPr>
-            <a:r>
-              <a:rPr lang="en-US" altLang="en-US" sz="1400" dirty="0" smtClean="0"/>
-              <a:t>In </a:t>
-            </a:r>
-            <a:r>
-              <a:rPr lang="en-US" altLang="en-US" sz="1400" dirty="0"/>
-              <a:t>Java SE 7 and later, you can replace the type arguments required to invoke the constructor of a generic class with an empty set of type arguments (&lt;&gt;) as long as the compiler can determine, or infer, the type arguments from the context. </a:t>
-            </a:r>
-            <a:r>
-              <a:rPr lang="en-US" altLang="en-US" sz="1400" dirty="0"/>
-              <a:t>This pair of angle brackets, &lt;&gt;, is informally called the diamond. </a:t>
-            </a:r>
-            <a:r>
-              <a:rPr lang="en-US" altLang="en-US" sz="1400" dirty="0"/>
-              <a:t>For example, you can create an instance of Box&lt;Integer&gt; with the following statement </a:t>
-            </a:r>
-            <a:endParaRPr lang="en-US" altLang="en-US" sz="1400" dirty="0"/>
-          </a:p>
-          <a:p>
-            <a:pPr marL="685800" lvl="1" fontAlgn="base">
-              <a:lnSpc>
-                <a:spcPct val="150000"/>
-              </a:lnSpc>
-              <a:buFont typeface="Wingdings" panose="05000000000000000000" pitchFamily="2" charset="2"/>
-              <a:buChar char="Ø"/>
-            </a:pPr>
-            <a:r>
-              <a:rPr lang="en-US" altLang="en-US" sz="1400" dirty="0"/>
-              <a:t>Box&lt;Integer&gt; </a:t>
-            </a:r>
-            <a:r>
-              <a:rPr lang="en-US" altLang="en-US" sz="1400" dirty="0" err="1"/>
-              <a:t>integerBox</a:t>
-            </a:r>
-            <a:r>
-              <a:rPr lang="en-US" altLang="en-US" sz="1400" dirty="0"/>
-              <a:t> = new Box&lt;&gt;();</a:t>
-            </a:r>
-          </a:p>
-          <a:p>
-            <a:pPr marL="285750" fontAlgn="base">
-              <a:lnSpc>
-                <a:spcPct val="150000"/>
-              </a:lnSpc>
-              <a:buFont typeface="Wingdings" panose="05000000000000000000" pitchFamily="2" charset="2"/>
-              <a:buChar char="Ø"/>
-            </a:pPr>
-            <a:r>
-              <a:rPr lang="en-US" altLang="en-US" sz="1400" dirty="0"/>
-              <a:t> </a:t>
-            </a:r>
-            <a:r>
-              <a:rPr lang="en-US" altLang="en-US" sz="1400" dirty="0"/>
-              <a:t>Because </a:t>
-            </a:r>
-            <a:r>
-              <a:rPr lang="en-US" altLang="en-US" sz="1400" dirty="0"/>
-              <a:t>a Java compiler can infer </a:t>
-            </a:r>
-            <a:r>
-              <a:rPr lang="en-US" altLang="en-US" sz="1400" dirty="0" smtClean="0"/>
-              <a:t>the</a:t>
-            </a:r>
-            <a:r>
-              <a:rPr lang="en-US" altLang="en-US" sz="1400" dirty="0"/>
-              <a:t> types from the declaration </a:t>
-            </a:r>
-            <a:r>
-              <a:rPr lang="en-US" altLang="en-US" sz="1400" dirty="0"/>
-              <a:t> Box&lt;Integer&gt; </a:t>
-            </a:r>
-            <a:r>
-              <a:rPr lang="en-US" altLang="en-US" sz="1400" dirty="0" smtClean="0"/>
-              <a:t>, the </a:t>
-            </a:r>
-            <a:r>
-              <a:rPr lang="en-US" altLang="en-US" sz="1400" dirty="0" err="1" smtClean="0"/>
-              <a:t>insytantiation</a:t>
-            </a:r>
-            <a:r>
-              <a:rPr lang="en-US" altLang="en-US" sz="1400" dirty="0" smtClean="0"/>
-              <a:t> </a:t>
-            </a:r>
-            <a:r>
-              <a:rPr lang="en-US" altLang="en-US" sz="1400" dirty="0"/>
-              <a:t>statements can be </a:t>
-            </a:r>
-            <a:r>
-              <a:rPr lang="en-US" altLang="en-US" sz="1400" dirty="0" smtClean="0"/>
-              <a:t>   shortened </a:t>
-            </a:r>
-            <a:r>
-              <a:rPr lang="en-US" altLang="en-US" sz="1400" dirty="0"/>
-              <a:t>using diamond </a:t>
-            </a:r>
-            <a:r>
-              <a:rPr lang="en-US" altLang="en-US" sz="1400" dirty="0" smtClean="0"/>
-              <a:t>notation</a:t>
-            </a:r>
-            <a:r>
-              <a:rPr lang="en-US" altLang="en-US" sz="1400" dirty="0"/>
-              <a:t> </a:t>
-            </a:r>
-            <a:r>
-              <a:rPr lang="en-US" altLang="en-US" sz="1400" dirty="0" smtClean="0"/>
-              <a:t>and we do not need to specify type in </a:t>
-            </a:r>
-            <a:r>
-              <a:rPr lang="en-US" altLang="en-US" sz="1400" dirty="0"/>
-              <a:t>new Box</a:t>
-            </a:r>
-            <a:r>
-              <a:rPr lang="en-US" altLang="en-US" sz="1400" dirty="0" smtClean="0"/>
-              <a:t>&lt;&gt;();</a:t>
-            </a:r>
-          </a:p>
-          <a:p>
-            <a:pPr marL="285750" fontAlgn="base">
-              <a:lnSpc>
-                <a:spcPct val="150000"/>
-              </a:lnSpc>
-              <a:buFont typeface="Wingdings" panose="05000000000000000000" pitchFamily="2" charset="2"/>
-              <a:buChar char="Ø"/>
-            </a:pPr>
-            <a:r>
-              <a:rPr lang="en-US" altLang="en-US" sz="1400" dirty="0"/>
-              <a:t>You can also substitute a type parameter (i.e., K or V) with a parameterized type (i.e., List&lt;String&gt;). For example, using the </a:t>
-            </a:r>
-            <a:r>
-              <a:rPr lang="en-US" altLang="en-US" sz="1400" dirty="0" err="1"/>
-              <a:t>OrderedPair</a:t>
-            </a:r>
-            <a:r>
-              <a:rPr lang="en-US" altLang="en-US" sz="1400" dirty="0"/>
-              <a:t>&lt;K, V&gt; </a:t>
-            </a:r>
-            <a:r>
-              <a:rPr lang="en-US" altLang="en-US" sz="1400" dirty="0"/>
-              <a:t>example</a:t>
-            </a:r>
-          </a:p>
-          <a:p>
-            <a:pPr marL="685800" lvl="1" fontAlgn="base">
-              <a:lnSpc>
-                <a:spcPct val="150000"/>
-              </a:lnSpc>
-              <a:buFont typeface="Wingdings" panose="05000000000000000000" pitchFamily="2" charset="2"/>
-              <a:buChar char="Ø"/>
-            </a:pPr>
-            <a:r>
-              <a:rPr lang="en-US" altLang="en-US" sz="1400" dirty="0" err="1"/>
-              <a:t>OrderedPair</a:t>
-            </a:r>
-            <a:r>
-              <a:rPr lang="en-US" altLang="en-US" sz="1400" dirty="0"/>
-              <a:t>&lt;String, Box&lt;Integer&gt;&gt; p = new </a:t>
-            </a:r>
-            <a:r>
-              <a:rPr lang="en-US" altLang="en-US" sz="1400" dirty="0" err="1"/>
-              <a:t>OrderedPair</a:t>
-            </a:r>
-            <a:r>
-              <a:rPr lang="en-US" altLang="en-US" sz="1400" dirty="0"/>
-              <a:t>&lt;&gt;("primes", new Box&lt;Integer&gt;(...)); </a:t>
-            </a:r>
-          </a:p>
-          <a:p>
-            <a:pPr marL="400050" lvl="1" indent="0" fontAlgn="base">
-              <a:lnSpc>
-                <a:spcPct val="150000"/>
-              </a:lnSpc>
-              <a:buNone/>
-            </a:pPr>
-            <a:endParaRPr lang="en-US" altLang="en-US" sz="1200" dirty="0"/>
-          </a:p>
-          <a:p>
-            <a:pPr marL="285750" fontAlgn="base">
-              <a:lnSpc>
-                <a:spcPct val="150000"/>
-              </a:lnSpc>
-              <a:buFont typeface="Wingdings" panose="05000000000000000000" pitchFamily="2" charset="2"/>
-              <a:buChar char="Ø"/>
-            </a:pPr>
-            <a:endParaRPr lang="en-US" altLang="en-US" sz="1400" dirty="0"/>
-          </a:p>
-        </p:txBody>
-      </p:sp>
-    </p:spTree>
-    <p:extLst>
-      <p:ext uri="{BB962C8B-B14F-4D97-AF65-F5344CB8AC3E}">
-        <p14:creationId xmlns:p14="http://schemas.microsoft.com/office/powerpoint/2010/main" val="2790138978"/>
-      </p:ext>
-    </p:extLst>
-  </p:cSld>
-  <p:clrMapOvr>
-    <a:masterClrMapping/>
-  </p:clrMapOvr>
-  <p:timing>
-    <p:tnLst>
-      <p:par>
-        <p:cTn id="1" dur="indefinite" restart="never" nodeType="tmRoot"/>
-      </p:par>
-    </p:tnLst>
-  </p:timing>
-</p:sld>
-</file>
-
-<file path=ppt/slides/slide17.xml><?xml version="1.0" encoding="utf-8"?>
-<p:sld xmlns:a="http://schemas.openxmlformats.org/drawingml/2006/main" xmlns:r="http://schemas.openxmlformats.org/officeDocument/2006/relationships" xmlns:p="http://schemas.openxmlformats.org/presentationml/2006/main">
-  <p:cSld>
-    <p:spTree>
-      <p:nvGrpSpPr>
-        <p:cNvPr id="1" name=""/>
-        <p:cNvGrpSpPr/>
-        <p:nvPr/>
-      </p:nvGrpSpPr>
-      <p:grpSpPr>
-        <a:xfrm>
-          <a:off x="0" y="0"/>
-          <a:ext cx="0" cy="0"/>
-          <a:chOff x="0" y="0"/>
-          <a:chExt cx="0" cy="0"/>
-        </a:xfrm>
-      </p:grpSpPr>
-      <p:sp>
-        <p:nvSpPr>
-          <p:cNvPr id="2" name="Title 1"/>
-          <p:cNvSpPr>
-            <a:spLocks noGrp="1"/>
-          </p:cNvSpPr>
-          <p:nvPr>
-            <p:ph type="title"/>
-          </p:nvPr>
-        </p:nvSpPr>
-        <p:spPr>
-          <a:xfrm>
-            <a:off x="513432" y="0"/>
-            <a:ext cx="8596668" cy="503208"/>
-          </a:xfrm>
-        </p:spPr>
-        <p:txBody>
-          <a:bodyPr>
-            <a:normAutofit fontScale="90000"/>
-          </a:bodyPr>
-          <a:lstStyle/>
-          <a:p>
-            <a:r>
-              <a:rPr lang="en-GB" dirty="0"/>
-              <a:t>Generic </a:t>
-            </a:r>
-            <a:r>
-              <a:rPr lang="en-GB" dirty="0" smtClean="0"/>
-              <a:t>Classes </a:t>
-            </a:r>
-            <a:r>
-              <a:rPr lang="en-GB" dirty="0" err="1" smtClean="0"/>
-              <a:t>Cont</a:t>
-            </a:r>
-            <a:r>
-              <a:rPr lang="en-GB" dirty="0" smtClean="0"/>
-              <a:t>…</a:t>
-            </a:r>
-            <a:endParaRPr lang="en-GB" dirty="0"/>
-          </a:p>
-        </p:txBody>
-      </p:sp>
-      <p:sp>
-        <p:nvSpPr>
-          <p:cNvPr id="3" name="Content Placeholder 2"/>
-          <p:cNvSpPr>
-            <a:spLocks noGrp="1"/>
-          </p:cNvSpPr>
-          <p:nvPr>
-            <p:ph idx="1"/>
-          </p:nvPr>
-        </p:nvSpPr>
-        <p:spPr>
-          <a:xfrm>
-            <a:off x="677334" y="646981"/>
-            <a:ext cx="10085916" cy="5394381"/>
-          </a:xfrm>
-        </p:spPr>
-        <p:txBody>
-          <a:bodyPr/>
-          <a:lstStyle/>
-          <a:p>
-            <a:endParaRPr lang="en-GB" dirty="0"/>
-          </a:p>
-        </p:txBody>
-      </p:sp>
-      <p:pic>
-        <p:nvPicPr>
-          <p:cNvPr id="5" name="Picture 4"/>
-          <p:cNvPicPr>
-            <a:picLocks noChangeAspect="1"/>
-          </p:cNvPicPr>
-          <p:nvPr/>
-        </p:nvPicPr>
-        <p:blipFill>
-          <a:blip r:embed="rId2"/>
-          <a:stretch>
-            <a:fillRect/>
-          </a:stretch>
-        </p:blipFill>
-        <p:spPr>
-          <a:xfrm>
-            <a:off x="677334" y="646981"/>
-            <a:ext cx="9983065" cy="6211019"/>
-          </a:xfrm>
-          <a:prstGeom prst="rect">
-            <a:avLst/>
-          </a:prstGeom>
-        </p:spPr>
-      </p:pic>
-    </p:spTree>
-    <p:extLst>
-      <p:ext uri="{BB962C8B-B14F-4D97-AF65-F5344CB8AC3E}">
-        <p14:creationId xmlns:p14="http://schemas.microsoft.com/office/powerpoint/2010/main" val="3213219512"/>
-      </p:ext>
-    </p:extLst>
-  </p:cSld>
-  <p:clrMapOvr>
-    <a:masterClrMapping/>
-  </p:clrMapOvr>
-  <p:timing>
-    <p:tnLst>
-      <p:par>
-        <p:cTn id="1" dur="indefinite" restart="never" nodeType="tmRoot"/>
-      </p:par>
-    </p:tnLst>
-  </p:timing>
-</p:sld>
-</file>
-
 <file path=ppt/slides/slide18.xml><?xml version="1.0" encoding="utf-8"?>
 <p:sld xmlns:a="http://schemas.openxmlformats.org/drawingml/2006/main" xmlns:r="http://schemas.openxmlformats.org/officeDocument/2006/relationships" xmlns:p="http://schemas.openxmlformats.org/presentationml/2006/main">
   <p:cSld>
@@ -9515,7 +10115,7 @@
         <p:spPr>
           <a:xfrm>
             <a:off x="0" y="0"/>
-            <a:ext cx="9404723" cy="694595"/>
+            <a:ext cx="9404723" cy="346295"/>
           </a:xfrm>
         </p:spPr>
         <p:txBody>
@@ -9523,10 +10123,10 @@
           <a:lstStyle/>
           <a:p>
             <a:r>
-              <a:rPr lang="en-GB" sz="3600" dirty="0" smtClean="0"/>
+              <a:rPr lang="en-GB" sz="2000" dirty="0" smtClean="0"/>
               <a:t>Raw Types</a:t>
             </a:r>
-            <a:endParaRPr lang="en-GB" sz="3600" dirty="0"/>
+            <a:endParaRPr lang="en-GB" sz="2000" dirty="0"/>
           </a:p>
         </p:txBody>
       </p:sp>
@@ -9542,8 +10142,8 @@
         </p:nvSpPr>
         <p:spPr bwMode="auto">
           <a:xfrm>
-            <a:off x="425969" y="520445"/>
-            <a:ext cx="11766031" cy="5844780"/>
+            <a:off x="425969" y="346295"/>
+            <a:ext cx="11766031" cy="6193080"/>
           </a:xfrm>
           <a:prstGeom prst="rect">
             <a:avLst/>
@@ -9742,19 +10342,7 @@
               <a:rPr lang="en-US" altLang="en-US" sz="1300" b="1" dirty="0">
                 <a:latin typeface="+mj-lt"/>
               </a:rPr>
-              <a:t> raw </a:t>
-            </a:r>
-            <a:r>
-              <a:rPr lang="en-US" altLang="en-US" sz="1300" b="1" dirty="0">
-                <a:latin typeface="+mj-lt"/>
-              </a:rPr>
-              <a:t>type is the name of a generic class or interface without any type arguments. </a:t>
-            </a:r>
-            <a:r>
-              <a:rPr lang="en-US" altLang="en-US" sz="1300" b="1" dirty="0">
-                <a:latin typeface="+mj-lt"/>
-              </a:rPr>
-              <a:t>For example, given the generic Box class:</a:t>
+              <a:t> raw type is the name of a generic class or interface without any type arguments. For example, given the generic Box class:</a:t>
             </a:r>
           </a:p>
           <a:p>
@@ -9807,13 +10395,7 @@
               <a:rPr lang="en-US" altLang="en-US" sz="1100" b="1" dirty="0">
                 <a:latin typeface="+mj-lt"/>
               </a:rPr>
-              <a:t>public </a:t>
-            </a:r>
-            <a:r>
-              <a:rPr lang="en-US" altLang="en-US" sz="1100" b="1" dirty="0">
-                <a:latin typeface="+mj-lt"/>
-              </a:rPr>
-              <a:t>void set(T t) { </a:t>
+              <a:t>public void set(T t) { </a:t>
             </a:r>
             <a:r>
               <a:rPr lang="en-US" altLang="en-US" sz="1100" b="1" dirty="0" smtClean="0">
@@ -10005,13 +10587,7 @@
               <a:rPr lang="en-US" altLang="en-US" sz="1300" b="1" dirty="0">
                 <a:latin typeface="+mj-lt"/>
               </a:rPr>
-              <a:t>Raw types show up in legacy code because lots of API classes (such as the Collections classes) were not generic prior to JDK 5.0. </a:t>
-            </a:r>
-            <a:r>
-              <a:rPr lang="en-US" altLang="en-US" sz="1300" b="1" dirty="0">
-                <a:latin typeface="+mj-lt"/>
-              </a:rPr>
-              <a:t>When using </a:t>
+              <a:t>Raw types show up in legacy code because lots of API classes (such as the Collections classes) were not generic prior to JDK 5.0. When using </a:t>
             </a:r>
             <a:endParaRPr lang="en-US" altLang="en-US" sz="1300" b="1" dirty="0" smtClean="0">
               <a:latin typeface="+mj-lt"/>
@@ -10106,7 +10682,40 @@
               <a:rPr lang="en-US" altLang="en-US" sz="1100" b="1" dirty="0">
                 <a:latin typeface="+mj-lt"/>
               </a:rPr>
-              <a:t> = new Box&lt;&gt;(); Box </a:t>
+              <a:t> = new Box</a:t>
+            </a:r>
+            <a:r>
+              <a:rPr lang="en-US" altLang="en-US" sz="1100" b="1" dirty="0" smtClean="0">
+                <a:latin typeface="+mj-lt"/>
+              </a:rPr>
+              <a:t>&lt;&gt;();</a:t>
+            </a:r>
+          </a:p>
+          <a:p>
+            <a:pPr marL="685800" lvl="1" eaLnBrk="1" hangingPunct="1">
+              <a:lnSpc>
+                <a:spcPct val="130000"/>
+              </a:lnSpc>
+              <a:spcBef>
+                <a:spcPts val="1000"/>
+              </a:spcBef>
+              <a:spcAft>
+                <a:spcPts val="0"/>
+              </a:spcAft>
+              <a:buFont typeface="Wingdings" panose="05000000000000000000" pitchFamily="2" charset="2"/>
+              <a:buChar char="Ø"/>
+            </a:pPr>
+            <a:r>
+              <a:rPr lang="en-US" altLang="en-US" sz="1100" b="1" dirty="0" smtClean="0">
+                <a:latin typeface="+mj-lt"/>
+              </a:rPr>
+              <a:t> </a:t>
+            </a:r>
+            <a:r>
+              <a:rPr lang="en-US" altLang="en-US" sz="1100" b="1" dirty="0">
+                <a:latin typeface="+mj-lt"/>
+              </a:rPr>
+              <a:t>Box </a:t>
             </a:r>
             <a:r>
               <a:rPr lang="en-US" altLang="en-US" sz="1100" b="1" dirty="0" err="1">
@@ -10681,13 +11290,7 @@
               <a:rPr lang="en-US" altLang="en-US" sz="1300" b="1" dirty="0">
                 <a:latin typeface="+mj-lt"/>
               </a:rPr>
-              <a:t>The warning shows that raw types bypass generic type checks, deferring the catch of unsafe code to runtime. </a:t>
-            </a:r>
-            <a:r>
-              <a:rPr lang="en-US" altLang="en-US" sz="1300" b="1" dirty="0">
-                <a:latin typeface="+mj-lt"/>
-              </a:rPr>
-              <a:t>Therefore, you should avoid using </a:t>
+              <a:t>The warning shows that raw types bypass generic type checks, deferring the catch of unsafe code to runtime. Therefore, you should avoid using </a:t>
             </a:r>
             <a:r>
               <a:rPr lang="en-US" altLang="en-US" sz="1300" b="1" dirty="0" smtClean="0">
@@ -11639,8 +12242,8 @@
         </p:nvSpPr>
         <p:spPr>
           <a:xfrm>
-            <a:off x="677333" y="638355"/>
-            <a:ext cx="11409891" cy="5733870"/>
+            <a:off x="578657" y="1124130"/>
+            <a:ext cx="11409891" cy="5526650"/>
           </a:xfrm>
         </p:spPr>
         <p:txBody>
@@ -11726,11 +12329,7 @@
             </a:r>
             <a:r>
               <a:rPr lang="en-US" altLang="en-US" sz="1400" dirty="0"/>
-              <a:t>is Number. </a:t>
-            </a:r>
-            <a:r>
-              <a:rPr lang="en-US" altLang="en-US" sz="1400" dirty="0"/>
-              <a:t>Note that, in this context, extends is used in a general sense to mean either "extends" (as in classes) or "implements" (as in interfaces). </a:t>
+              <a:t>is Number. Note that, in this context, extends is used in a general sense to mean either "extends" (as in classes) or "implements" (as in interfaces). </a:t>
             </a:r>
             <a:endParaRPr lang="en-IN" sz="1400" dirty="0"/>
           </a:p>
@@ -11993,11 +12592,7 @@
             </a:pPr>
             <a:r>
               <a:rPr lang="en-IN" sz="1400" dirty="0" smtClean="0"/>
-              <a:t>For </a:t>
-            </a:r>
-            <a:r>
-              <a:rPr lang="en-IN" sz="1400" dirty="0" smtClean="0"/>
-              <a:t>example:</a:t>
+              <a:t>For example:</a:t>
             </a:r>
             <a:endParaRPr lang="en-IN" sz="1400" dirty="0"/>
           </a:p>
@@ -12365,13 +12960,7 @@
               <a:rPr lang="en-US" altLang="en-US" sz="1400" dirty="0">
                 <a:latin typeface="+mj-lt"/>
               </a:rPr>
-              <a:t>Bounded type parameters are key to the implementation of generic algorithms. </a:t>
-            </a:r>
-            <a:r>
-              <a:rPr lang="en-US" altLang="en-US" sz="1400" dirty="0">
-                <a:latin typeface="+mj-lt"/>
-              </a:rPr>
-              <a:t>Consider the following method that counts the number of elements in an array T[] that are greater than a specified element </a:t>
+              <a:t>Bounded type parameters are key to the implementation of generic algorithms. Consider the following method that counts the number of elements in an array T[] that are greater than a specified element </a:t>
             </a:r>
             <a:r>
               <a:rPr lang="en-US" altLang="en-US" sz="1400" dirty="0" smtClean="0">
@@ -12642,31 +13231,19 @@
               <a:rPr lang="en-US" altLang="en-US" sz="1400" dirty="0">
                 <a:latin typeface="+mj-lt"/>
               </a:rPr>
-              <a:t>The </a:t>
+              <a:t>The implementation of the method is straightforward, but it does not compile because the greater than operator (&gt;) applies only to primitive types such as short, </a:t>
+            </a:r>
+            <a:r>
+              <a:rPr lang="en-US" altLang="en-US" sz="1400" dirty="0" err="1">
+                <a:latin typeface="+mj-lt"/>
+              </a:rPr>
+              <a:t>int</a:t>
             </a:r>
             <a:r>
               <a:rPr lang="en-US" altLang="en-US" sz="1400" dirty="0">
                 <a:latin typeface="+mj-lt"/>
               </a:rPr>
-              <a:t>implementation of the method is straightforward, but it does not compile because the greater than operator (&gt;) applies only to primitive types such as short, </a:t>
-            </a:r>
-            <a:r>
-              <a:rPr lang="en-US" altLang="en-US" sz="1400" dirty="0" err="1">
-                <a:latin typeface="+mj-lt"/>
-              </a:rPr>
-              <a:t>int</a:t>
-            </a:r>
-            <a:r>
-              <a:rPr lang="en-US" altLang="en-US" sz="1400" dirty="0">
-                <a:latin typeface="+mj-lt"/>
-              </a:rPr>
-              <a:t>, double, long, float, byte, and char. You cannot use the &gt; operator to compare objects. </a:t>
-            </a:r>
-            <a:r>
-              <a:rPr lang="en-US" altLang="en-US" sz="1400" dirty="0">
-                <a:latin typeface="+mj-lt"/>
-              </a:rPr>
-              <a:t>To fix the problem, use a type parameter bounded by the Comparable&lt;T&gt; </a:t>
+              <a:t>, double, long, float, byte, and char. You cannot use the &gt; operator to compare objects. To fix the problem, use a type parameter bounded by the Comparable&lt;T&gt; </a:t>
             </a:r>
             <a:r>
               <a:rPr lang="en-US" altLang="en-US" sz="1400" dirty="0" smtClean="0">
@@ -13540,19 +14117,7 @@
               <a:rPr lang="en-US" altLang="en-US" sz="1600" dirty="0">
                 <a:latin typeface="+mj-lt"/>
               </a:rPr>
-              <a:t>object-oriented terminology, this is called an "is a" relationship. </a:t>
-            </a:r>
-            <a:r>
-              <a:rPr lang="en-US" altLang="en-US" sz="1600" dirty="0">
-                <a:latin typeface="+mj-lt"/>
-              </a:rPr>
-              <a:t>Since an Integer is a kind of Object, the assignment is allowed. </a:t>
-            </a:r>
-            <a:r>
-              <a:rPr lang="en-US" altLang="en-US" sz="1600" dirty="0">
-                <a:latin typeface="+mj-lt"/>
-              </a:rPr>
-              <a:t>But Integer is also a kind of Number, so the following code is valid as </a:t>
+              <a:t>object-oriented terminology, this is called an "is a" relationship. Since an Integer is a kind of Object, the assignment is allowed. But Integer is also a kind of Number, so the following code is valid as </a:t>
             </a:r>
             <a:r>
               <a:rPr lang="en-US" altLang="en-US" sz="1600" dirty="0" smtClean="0">
@@ -13592,13 +14157,7 @@
               <a:rPr lang="en-US" altLang="en-US" sz="1200" dirty="0">
                 <a:latin typeface="+mj-lt"/>
               </a:rPr>
-              <a:t>(Number n) { /* ... </a:t>
-            </a:r>
-            <a:r>
-              <a:rPr lang="en-US" altLang="en-US" sz="1200" dirty="0">
-                <a:latin typeface="+mj-lt"/>
-              </a:rPr>
-              <a:t>*/ </a:t>
+              <a:t>(Number n) { /* ... */ </a:t>
             </a:r>
             <a:r>
               <a:rPr lang="en-US" altLang="en-US" sz="1200" dirty="0" smtClean="0">
@@ -13843,7 +14402,6 @@
               <a:rPr lang="en-GB" sz="2400" b="1" dirty="0"/>
               <a:t>Generics, Inheritance, and Subtypes</a:t>
             </a:r>
-            <a:endParaRPr lang="en-GB" sz="2400" b="1" dirty="0"/>
           </a:p>
         </p:txBody>
       </p:sp>
@@ -14103,13 +14661,7 @@
               <a:rPr lang="en-US" altLang="en-US" sz="1400" dirty="0">
                 <a:latin typeface="+mj-lt"/>
               </a:rPr>
-              <a:t>By looking at its signature, you can see that it accepts a single argument whose type is Box&lt;Number&gt;. </a:t>
-            </a:r>
-            <a:r>
-              <a:rPr lang="en-US" altLang="en-US" sz="1400" dirty="0">
-                <a:latin typeface="+mj-lt"/>
-              </a:rPr>
-              <a:t>But what does that </a:t>
+              <a:t>By looking at its signature, you can see that it accepts a single argument whose type is Box&lt;Number&gt;. But what does that </a:t>
             </a:r>
             <a:r>
               <a:rPr lang="en-US" altLang="en-US" sz="1400" dirty="0" smtClean="0">
@@ -14757,13 +15309,7 @@
               <a:rPr lang="en-US" altLang="en-US" sz="1400" dirty="0">
                 <a:latin typeface="+mj-lt"/>
               </a:rPr>
-              <a:t>You can subtype a generic class or interface by extending or implementing it. </a:t>
-            </a:r>
-            <a:r>
-              <a:rPr lang="en-US" altLang="en-US" sz="1400" dirty="0">
-                <a:latin typeface="+mj-lt"/>
-              </a:rPr>
-              <a:t>The relationship between the type parameters of one class or interface and the type parameters of another are determined by the extends and implements </a:t>
+              <a:t>You can subtype a generic class or interface by extending or implementing it. The relationship between the type parameters of one class or interface and the type parameters of another are determined by the extends and implements </a:t>
             </a:r>
             <a:r>
               <a:rPr lang="en-US" altLang="en-US" sz="1400" dirty="0" smtClean="0">
@@ -14785,13 +15331,19 @@
               <a:rPr lang="en-US" altLang="en-US" sz="1400" dirty="0">
                 <a:latin typeface="+mj-lt"/>
               </a:rPr>
-              <a:t>Using </a:t>
+              <a:t>Using the Collections classes as an example, </a:t>
+            </a:r>
+            <a:r>
+              <a:rPr lang="en-US" altLang="en-US" sz="1400" dirty="0" err="1">
+                <a:latin typeface="+mj-lt"/>
+              </a:rPr>
+              <a:t>ArrayList</a:t>
             </a:r>
             <a:r>
               <a:rPr lang="en-US" altLang="en-US" sz="1400" dirty="0">
                 <a:latin typeface="+mj-lt"/>
               </a:rPr>
-              <a:t>the Collections classes as an example, </a:t>
+              <a:t>&lt;E&gt; implements List&lt;E&gt;, and List&lt;E&gt; extends Collection&lt;E&gt;. So </a:t>
             </a:r>
             <a:r>
               <a:rPr lang="en-US" altLang="en-US" sz="1400" dirty="0" err="1">
@@ -14803,25 +15355,7 @@
               <a:rPr lang="en-US" altLang="en-US" sz="1400" dirty="0">
                 <a:latin typeface="+mj-lt"/>
               </a:rPr>
-              <a:t>&lt;E&gt; implements List&lt;E&gt;, and List&lt;E&gt; extends Collection&lt;E&gt;. So </a:t>
-            </a:r>
-            <a:r>
-              <a:rPr lang="en-US" altLang="en-US" sz="1400" dirty="0" err="1">
-                <a:latin typeface="+mj-lt"/>
-              </a:rPr>
-              <a:t>ArrayList</a:t>
-            </a:r>
-            <a:r>
-              <a:rPr lang="en-US" altLang="en-US" sz="1400" dirty="0">
-                <a:latin typeface="+mj-lt"/>
-              </a:rPr>
-              <a:t>&lt;String&gt; is a subtype of List&lt;String&gt;, which is a subtype of Collection&lt;String&gt;. </a:t>
-            </a:r>
-            <a:r>
-              <a:rPr lang="en-US" altLang="en-US" sz="1400" dirty="0">
-                <a:latin typeface="+mj-lt"/>
-              </a:rPr>
-              <a:t>So long as you do not vary the type argument, the subtyping relationship is preserved between the </a:t>
+              <a:t>&lt;String&gt; is a subtype of List&lt;String&gt;, which is a subtype of Collection&lt;String&gt;. So long as you do not vary the type argument, the subtyping relationship is preserved between the </a:t>
             </a:r>
             <a:r>
               <a:rPr lang="en-US" altLang="en-US" sz="1400" dirty="0" smtClean="0">
@@ -15238,17 +15772,8 @@
             </a:r>
             <a:r>
               <a:rPr lang="en-IN" sz="1400" dirty="0"/>
-              <a:t>The inference algorithm determines the types of the arguments and, if available, the type that the result is being assigned, or returned. </a:t>
-            </a:r>
-            <a:r>
-              <a:rPr lang="en-IN" sz="1400" dirty="0"/>
-              <a:t>Finally, the inference algorithm tries to find the most specific type that works with all of the arguments</a:t>
-            </a:r>
-            <a:r>
-              <a:rPr lang="en-IN" sz="1400" dirty="0"/>
-              <a:t>.</a:t>
-            </a:r>
-            <a:endParaRPr lang="en-IN" sz="1400" dirty="0"/>
+              <a:t>The inference algorithm determines the types of the arguments and, if available, the type that the result is being assigned, or returned. Finally, the inference algorithm tries to find the most specific type that works with all of the arguments.</a:t>
+            </a:r>
           </a:p>
           <a:p>
             <a:r>
@@ -15385,27 +15910,7 @@
           <a:p>
             <a:r>
               <a:rPr lang="en-IN" sz="1400" dirty="0"/>
-              <a:t>Type </a:t>
-            </a:r>
-            <a:r>
-              <a:rPr lang="en-IN" sz="1400" dirty="0"/>
-              <a:t>inference</a:t>
-            </a:r>
-            <a:r>
-              <a:rPr lang="en-IN" sz="1400" dirty="0"/>
-              <a:t>, </a:t>
-            </a:r>
-            <a:r>
-              <a:rPr lang="en-IN" sz="1400" dirty="0"/>
-              <a:t>enables you to invoke a generic method as you would </a:t>
-            </a:r>
-            <a:r>
-              <a:rPr lang="en-IN" sz="1400" dirty="0"/>
-              <a:t>invoke an </a:t>
-            </a:r>
-            <a:r>
-              <a:rPr lang="en-IN" sz="1400" dirty="0"/>
-              <a:t>ordinary method, without specifying a type between angle brackets</a:t>
+              <a:t>Type inference, enables you to invoke a generic method as you would invoke an ordinary method, without specifying a type between angle brackets</a:t>
             </a:r>
             <a:r>
               <a:rPr lang="en-IN" sz="1400" dirty="0" smtClean="0"/>
@@ -15469,27 +15974,17 @@
               <a:rPr lang="en-US" altLang="en-US" sz="1400" dirty="0"/>
               <a:t> defines one type parameter named U. </a:t>
             </a:r>
-            <a:endParaRPr lang="en-US" altLang="en-US" sz="1400" dirty="0"/>
           </a:p>
           <a:p>
             <a:r>
               <a:rPr lang="en-US" altLang="en-US" sz="1400" dirty="0"/>
-              <a:t>Generally</a:t>
-            </a:r>
+              <a:t>Generally, a Java compiler can infer the type parameters of a generic method call. </a:t>
+            </a:r>
+          </a:p>
+          <a:p>
             <a:r>
               <a:rPr lang="en-US" altLang="en-US" sz="1400" dirty="0"/>
-              <a:t>, a Java compiler can infer the type parameters of a generic method call. </a:t>
-            </a:r>
-            <a:endParaRPr lang="en-US" altLang="en-US" sz="1400" dirty="0"/>
-          </a:p>
-          <a:p>
-            <a:r>
-              <a:rPr lang="en-US" altLang="en-US" sz="1400" dirty="0"/>
-              <a:t>Consequently</a:t>
-            </a:r>
-            <a:r>
-              <a:rPr lang="en-US" altLang="en-US" sz="1400" dirty="0"/>
-              <a:t>, in most cases, you do not have to specify them. </a:t>
+              <a:t>Consequently, in most cases, you do not have to specify them. </a:t>
             </a:r>
             <a:endParaRPr lang="en-US" altLang="en-US" sz="1400" dirty="0" smtClean="0"/>
           </a:p>
@@ -15508,11 +16003,7 @@
           <a:p>
             <a:r>
               <a:rPr lang="en-US" altLang="en-US" sz="1400" dirty="0"/>
-              <a:t>To </a:t>
-            </a:r>
-            <a:r>
-              <a:rPr lang="en-US" altLang="en-US" sz="1400" dirty="0"/>
-              <a:t>invoke the generic method </a:t>
+              <a:t>To invoke the generic method </a:t>
             </a:r>
             <a:r>
               <a:rPr lang="en-US" altLang="en-US" sz="1400" dirty="0" err="1"/>
@@ -15520,24 +16011,16 @@
             </a:r>
             <a:r>
               <a:rPr lang="en-US" altLang="en-US" sz="1400" dirty="0"/>
-              <a:t>, you can specify </a:t>
-            </a:r>
+              <a:t>, you can specify the</a:t>
+            </a:r>
+          </a:p>
+          <a:p>
+            <a:pPr marL="0" indent="0">
+              <a:buNone/>
+            </a:pPr>
             <a:r>
               <a:rPr lang="en-US" altLang="en-US" sz="1400" dirty="0"/>
-              <a:t>the</a:t>
-            </a:r>
-          </a:p>
-          <a:p>
-            <a:pPr marL="0" indent="0">
-              <a:buNone/>
-            </a:pPr>
-            <a:r>
-              <a:rPr lang="en-US" altLang="en-US" sz="1400" dirty="0"/>
-              <a:t> </a:t>
-            </a:r>
-            <a:r>
-              <a:rPr lang="en-US" altLang="en-US" sz="1400" dirty="0"/>
-              <a:t>   </a:t>
+              <a:t>    </a:t>
             </a:r>
             <a:r>
               <a:rPr lang="en-US" altLang="en-US" sz="1400" dirty="0" smtClean="0"/>
@@ -15545,15 +16028,7 @@
             </a:r>
             <a:r>
               <a:rPr lang="en-US" altLang="en-US" sz="1400" dirty="0"/>
-              <a:t>parameter with </a:t>
-            </a:r>
-            <a:r>
-              <a:rPr lang="en-US" altLang="en-US" sz="1400" dirty="0"/>
-              <a:t>something called a </a:t>
-            </a:r>
-            <a:r>
-              <a:rPr lang="en-US" altLang="en-US" sz="1400" dirty="0"/>
-              <a:t> type witness as follows: </a:t>
+              <a:t>parameter with something called a  type witness as follows: </a:t>
             </a:r>
             <a:endParaRPr lang="en-US" altLang="en-US" sz="1400" dirty="0" smtClean="0"/>
           </a:p>
@@ -15856,49 +16331,7 @@
                 <a:latin typeface="Verdana" panose="020B0604030504040204" pitchFamily="34" charset="0"/>
                 <a:ea typeface="Verdana" panose="020B0604030504040204" pitchFamily="34" charset="0"/>
               </a:rPr>
-              <a:t>The </a:t>
-            </a:r>
-            <a:r>
-              <a:rPr lang="en-IN" sz="1600" dirty="0" smtClean="0">
-                <a:latin typeface="Verdana" panose="020B0604030504040204" pitchFamily="34" charset="0"/>
-                <a:ea typeface="Verdana" panose="020B0604030504040204" pitchFamily="34" charset="0"/>
-              </a:rPr>
-              <a:t>methods </a:t>
-            </a:r>
-            <a:r>
-              <a:rPr lang="en-IN" sz="1600" dirty="0" smtClean="0">
-                <a:latin typeface="Verdana" panose="020B0604030504040204" pitchFamily="34" charset="0"/>
-                <a:ea typeface="Verdana" panose="020B0604030504040204" pitchFamily="34" charset="0"/>
-              </a:rPr>
-              <a:t>effectively </a:t>
-            </a:r>
-            <a:r>
-              <a:rPr lang="en-IN" sz="1600" dirty="0" smtClean="0">
-                <a:latin typeface="Verdana" panose="020B0604030504040204" pitchFamily="34" charset="0"/>
-                <a:ea typeface="Verdana" panose="020B0604030504040204" pitchFamily="34" charset="0"/>
-              </a:rPr>
-              <a:t>have </a:t>
-            </a:r>
-            <a:r>
-              <a:rPr lang="en-IN" sz="1600" dirty="0" smtClean="0">
-                <a:latin typeface="Verdana" panose="020B0604030504040204" pitchFamily="34" charset="0"/>
-                <a:ea typeface="Verdana" panose="020B0604030504040204" pitchFamily="34" charset="0"/>
-              </a:rPr>
-              <a:t>the same </a:t>
-            </a:r>
-            <a:r>
-              <a:rPr lang="en-IN" sz="1600" dirty="0" smtClean="0">
-                <a:latin typeface="Verdana" panose="020B0604030504040204" pitchFamily="34" charset="0"/>
-                <a:ea typeface="Verdana" panose="020B0604030504040204" pitchFamily="34" charset="0"/>
-              </a:rPr>
-              <a:t>code , but </a:t>
-            </a:r>
-            <a:r>
-              <a:rPr lang="en-IN" sz="1600" dirty="0" smtClean="0">
-                <a:latin typeface="Verdana" panose="020B0604030504040204" pitchFamily="34" charset="0"/>
-                <a:ea typeface="Verdana" panose="020B0604030504040204" pitchFamily="34" charset="0"/>
-              </a:rPr>
-              <a:t>I still have to make multiple methods because of different parameter types.</a:t>
+              <a:t>The methods effectively have the same code , but I still have to make multiple methods because of different parameter types.</a:t>
             </a:r>
           </a:p>
           <a:p>
@@ -19373,15 +19806,7 @@
             </a:pPr>
             <a:r>
               <a:rPr lang="en-IN" dirty="0" smtClean="0"/>
-              <a:t>Secondly this is an unchecked </a:t>
-            </a:r>
-            <a:r>
-              <a:rPr lang="en-IN" dirty="0" smtClean="0"/>
-              <a:t>cast </a:t>
-            </a:r>
-            <a:r>
-              <a:rPr lang="en-IN" dirty="0" smtClean="0"/>
-              <a:t>and can result in </a:t>
+              <a:t>Secondly this is an unchecked cast and can result in </a:t>
             </a:r>
             <a:r>
               <a:rPr lang="en-IN" dirty="0" err="1" smtClean="0"/>
@@ -19397,19 +19822,7 @@
             </a:r>
             <a:r>
               <a:rPr lang="en-IN" dirty="0" smtClean="0"/>
-              <a:t>. </a:t>
-            </a:r>
-            <a:r>
-              <a:rPr lang="en-IN" dirty="0" smtClean="0"/>
-              <a:t>So there is no </a:t>
-            </a:r>
-            <a:r>
-              <a:rPr lang="en-IN" dirty="0" smtClean="0"/>
-              <a:t>type checking/type </a:t>
-            </a:r>
-            <a:r>
-              <a:rPr lang="en-IN" dirty="0" smtClean="0"/>
-              <a:t>safety.</a:t>
+              <a:t>. So there is no type checking/type safety.</a:t>
             </a:r>
             <a:endParaRPr lang="en-GB" dirty="0"/>
           </a:p>
@@ -26324,54 +26737,25 @@
           <a:p>
             <a:r>
               <a:rPr lang="en-GB" dirty="0" smtClean="0"/>
-              <a:t>We </a:t>
-            </a:r>
+              <a:t>We can solve the problems faced in previous slides using generics.</a:t>
+            </a:r>
+          </a:p>
+          <a:p>
             <a:r>
               <a:rPr lang="en-GB" dirty="0" smtClean="0"/>
-              <a:t>can solve the problems faced in previous slides using generics.</a:t>
+              <a:t>To make a generic add method that can take multiple type of parameters we can replace the data type of the parameters to add method by any valid java Identifier by convention we use T.</a:t>
             </a:r>
           </a:p>
           <a:p>
             <a:r>
               <a:rPr lang="en-GB" dirty="0" smtClean="0"/>
-              <a:t>To make a generic add method that can take multiple type of parameters we </a:t>
-            </a:r>
+              <a:t>We although do need to declare this just before the return type  in &lt;&gt; to let the compiler know that we are using generic types in this method. </a:t>
+            </a:r>
+          </a:p>
+          <a:p>
             <a:r>
               <a:rPr lang="en-GB" dirty="0" smtClean="0"/>
-              <a:t>can replace the data type of the parameters to add method by </a:t>
-            </a:r>
-            <a:r>
-              <a:rPr lang="en-GB" dirty="0" smtClean="0"/>
-              <a:t>any valid java </a:t>
-            </a:r>
-            <a:r>
-              <a:rPr lang="en-GB" dirty="0" smtClean="0"/>
-              <a:t>Identifier by convention we use T.</a:t>
-            </a:r>
-            <a:endParaRPr lang="en-GB" dirty="0" smtClean="0"/>
-          </a:p>
-          <a:p>
-            <a:r>
-              <a:rPr lang="en-GB" dirty="0" smtClean="0"/>
-              <a:t>We </a:t>
-            </a:r>
-            <a:r>
-              <a:rPr lang="en-GB" dirty="0" smtClean="0"/>
-              <a:t>although do need to declare this just before the return type  in &lt;&gt; to let the compiler know that we are using </a:t>
-            </a:r>
-            <a:r>
-              <a:rPr lang="en-GB" dirty="0" smtClean="0"/>
-              <a:t>generic types in this method. </a:t>
-            </a:r>
-          </a:p>
-          <a:p>
-            <a:r>
-              <a:rPr lang="en-GB" dirty="0" smtClean="0"/>
-              <a:t>This </a:t>
-            </a:r>
-            <a:r>
-              <a:rPr lang="en-GB" dirty="0" smtClean="0"/>
-              <a:t>T will be replaced by compiler into a real data type based on the data this method is called with.</a:t>
+              <a:t>This T will be replaced by compiler into a real data type based on the data this method is called with.</a:t>
             </a:r>
           </a:p>
           <a:p>
@@ -26739,7 +27123,6 @@
               <a:rPr lang="en-IN" sz="1800" dirty="0"/>
               <a:t>Cannot Create Instances of Type Parameters</a:t>
             </a:r>
-            <a:endParaRPr lang="en-IN" sz="1800" dirty="0"/>
           </a:p>
         </p:txBody>
       </p:sp>
@@ -29477,11 +29860,7 @@
             </a:pPr>
             <a:r>
               <a:rPr lang="en-IN" sz="1400" dirty="0" smtClean="0"/>
-              <a:t>After </a:t>
-            </a:r>
-            <a:r>
-              <a:rPr lang="en-IN" sz="1400" dirty="0" smtClean="0"/>
-              <a:t>Generics came into picture we can provide a type parameter to the class and then use that type parameter as data type for method parameters </a:t>
+              <a:t>After Generics came into picture we can provide a type parameter to the class and then use that type parameter as data type for method parameters </a:t>
             </a:r>
             <a:r>
               <a:rPr lang="en-IN" sz="1400" dirty="0"/>
@@ -30286,11 +30665,7 @@
             </a:r>
             <a:r>
               <a:rPr lang="en-IN" sz="1400" dirty="0" smtClean="0"/>
-              <a:t>Generics helps us to remove the need for type </a:t>
-            </a:r>
-            <a:r>
-              <a:rPr lang="en-IN" sz="1400" dirty="0" smtClean="0"/>
-              <a:t>casting.</a:t>
+              <a:t>Generics helps us to remove the need for type casting.</a:t>
             </a:r>
           </a:p>
           <a:p>
@@ -30307,11 +30682,7 @@
             </a:r>
             <a:r>
               <a:rPr lang="en-IN" sz="1400" dirty="0" smtClean="0"/>
-              <a:t> </a:t>
-            </a:r>
-            <a:r>
-              <a:rPr lang="en-IN" sz="1400" dirty="0" smtClean="0"/>
-              <a:t>concept parent reference can hold child object is applicable for only Base Type not Parameter type so</a:t>
+              <a:t> concept parent reference can hold child object is applicable for only Base Type not Parameter type so</a:t>
             </a:r>
           </a:p>
           <a:p>

</xml_diff>

<commit_message>
Bounded Parameters basic example
</commit_message>
<xml_diff>
--- a/src/main/resources/JavaGenerics.pptx
+++ b/src/main/resources/JavaGenerics.pptx
@@ -267,7 +267,7 @@
           <a:p>
             <a:fld id="{085A4362-1548-4C12-A63A-A7FA9FF20440}" type="datetimeFigureOut">
               <a:rPr lang="en-IN" smtClean="0"/>
-              <a:t>12-04-2020</a:t>
+              <a:t>14-04-2020</a:t>
             </a:fld>
             <a:endParaRPr lang="en-IN"/>
           </a:p>
@@ -714,6 +714,101 @@
 </p:notes>
 </file>
 
+<file path=ppt/notesSlides/notesSlide11.xml><?xml version="1.0" encoding="utf-8"?>
+<p:notes xmlns:a="http://schemas.openxmlformats.org/drawingml/2006/main" xmlns:r="http://schemas.openxmlformats.org/officeDocument/2006/relationships" xmlns:p="http://schemas.openxmlformats.org/presentationml/2006/main">
+  <p:cSld>
+    <p:spTree>
+      <p:nvGrpSpPr>
+        <p:cNvPr id="1" name=""/>
+        <p:cNvGrpSpPr/>
+        <p:nvPr/>
+      </p:nvGrpSpPr>
+      <p:grpSpPr>
+        <a:xfrm>
+          <a:off x="0" y="0"/>
+          <a:ext cx="0" cy="0"/>
+          <a:chOff x="0" y="0"/>
+          <a:chExt cx="0" cy="0"/>
+        </a:xfrm>
+      </p:grpSpPr>
+      <p:sp>
+        <p:nvSpPr>
+          <p:cNvPr id="2" name="Slide Image Placeholder 1"/>
+          <p:cNvSpPr>
+            <a:spLocks noGrp="1" noRot="1" noChangeAspect="1"/>
+          </p:cNvSpPr>
+          <p:nvPr>
+            <p:ph type="sldImg"/>
+          </p:nvPr>
+        </p:nvSpPr>
+        <p:spPr/>
+      </p:sp>
+      <p:sp>
+        <p:nvSpPr>
+          <p:cNvPr id="3" name="Notes Placeholder 2"/>
+          <p:cNvSpPr>
+            <a:spLocks noGrp="1"/>
+          </p:cNvSpPr>
+          <p:nvPr>
+            <p:ph type="body" idx="1"/>
+          </p:nvPr>
+        </p:nvSpPr>
+        <p:spPr/>
+        <p:txBody>
+          <a:bodyPr/>
+          <a:lstStyle/>
+          <a:p>
+            <a:r>
+              <a:rPr lang="en-GB" sz="1200" u="sng" kern="1200" smtClean="0">
+                <a:solidFill>
+                  <a:schemeClr val="tx1"/>
+                </a:solidFill>
+                <a:latin typeface="+mn-lt"/>
+                <a:ea typeface="+mn-ea"/>
+                <a:cs typeface="+mn-cs"/>
+              </a:rPr>
+              <a:t>BoundedTypeParametersExample1.java</a:t>
+            </a:r>
+            <a:endParaRPr lang="en-GB"/>
+          </a:p>
+        </p:txBody>
+      </p:sp>
+      <p:sp>
+        <p:nvSpPr>
+          <p:cNvPr id="4" name="Slide Number Placeholder 3"/>
+          <p:cNvSpPr>
+            <a:spLocks noGrp="1"/>
+          </p:cNvSpPr>
+          <p:nvPr>
+            <p:ph type="sldNum" sz="quarter" idx="10"/>
+          </p:nvPr>
+        </p:nvSpPr>
+        <p:spPr/>
+        <p:txBody>
+          <a:bodyPr/>
+          <a:lstStyle/>
+          <a:p>
+            <a:fld id="{EB8B6B8F-4498-4E9D-8DE1-125892E25737}" type="slidenum">
+              <a:rPr lang="en-IN" smtClean="0"/>
+              <a:t>21</a:t>
+            </a:fld>
+            <a:endParaRPr lang="en-IN"/>
+          </a:p>
+        </p:txBody>
+      </p:sp>
+    </p:spTree>
+    <p:extLst>
+      <p:ext uri="{BB962C8B-B14F-4D97-AF65-F5344CB8AC3E}">
+        <p14:creationId xmlns:p14="http://schemas.microsoft.com/office/powerpoint/2010/main" val="1399249486"/>
+      </p:ext>
+    </p:extLst>
+  </p:cSld>
+  <p:clrMapOvr>
+    <a:masterClrMapping/>
+  </p:clrMapOvr>
+</p:notes>
+</file>
+
 <file path=ppt/notesSlides/notesSlide2.xml><?xml version="1.0" encoding="utf-8"?>
 <p:notes xmlns:a="http://schemas.openxmlformats.org/drawingml/2006/main" xmlns:r="http://schemas.openxmlformats.org/officeDocument/2006/relationships" xmlns:p="http://schemas.openxmlformats.org/presentationml/2006/main">
   <p:cSld>
@@ -1683,7 +1778,7 @@
           <a:p>
             <a:fld id="{D4BA8270-C9CF-44CA-BE5A-02C2BDCCEDE4}" type="datetimeFigureOut">
               <a:rPr lang="en-GB" smtClean="0"/>
-              <a:t>12/04/2020</a:t>
+              <a:t>14/04/2020</a:t>
             </a:fld>
             <a:endParaRPr lang="en-GB"/>
           </a:p>
@@ -1958,7 +2053,7 @@
           <a:p>
             <a:fld id="{D4BA8270-C9CF-44CA-BE5A-02C2BDCCEDE4}" type="datetimeFigureOut">
               <a:rPr lang="en-GB" smtClean="0"/>
-              <a:t>12/04/2020</a:t>
+              <a:t>14/04/2020</a:t>
             </a:fld>
             <a:endParaRPr lang="en-GB"/>
           </a:p>
@@ -2152,7 +2247,7 @@
           <a:p>
             <a:fld id="{D4BA8270-C9CF-44CA-BE5A-02C2BDCCEDE4}" type="datetimeFigureOut">
               <a:rPr lang="en-GB" smtClean="0"/>
-              <a:t>12/04/2020</a:t>
+              <a:t>14/04/2020</a:t>
             </a:fld>
             <a:endParaRPr lang="en-GB"/>
           </a:p>
@@ -2425,7 +2520,7 @@
           <a:p>
             <a:fld id="{D4BA8270-C9CF-44CA-BE5A-02C2BDCCEDE4}" type="datetimeFigureOut">
               <a:rPr lang="en-GB" smtClean="0"/>
-              <a:t>12/04/2020</a:t>
+              <a:t>14/04/2020</a:t>
             </a:fld>
             <a:endParaRPr lang="en-GB"/>
           </a:p>
@@ -2766,7 +2861,7 @@
           <a:p>
             <a:fld id="{D4BA8270-C9CF-44CA-BE5A-02C2BDCCEDE4}" type="datetimeFigureOut">
               <a:rPr lang="en-GB" smtClean="0"/>
-              <a:t>12/04/2020</a:t>
+              <a:t>14/04/2020</a:t>
             </a:fld>
             <a:endParaRPr lang="en-GB"/>
           </a:p>
@@ -3389,7 +3484,7 @@
           <a:p>
             <a:fld id="{D4BA8270-C9CF-44CA-BE5A-02C2BDCCEDE4}" type="datetimeFigureOut">
               <a:rPr lang="en-GB" smtClean="0"/>
-              <a:t>12/04/2020</a:t>
+              <a:t>14/04/2020</a:t>
             </a:fld>
             <a:endParaRPr lang="en-GB"/>
           </a:p>
@@ -4249,7 +4344,7 @@
           <a:p>
             <a:fld id="{D4BA8270-C9CF-44CA-BE5A-02C2BDCCEDE4}" type="datetimeFigureOut">
               <a:rPr lang="en-GB" smtClean="0"/>
-              <a:t>12/04/2020</a:t>
+              <a:t>14/04/2020</a:t>
             </a:fld>
             <a:endParaRPr lang="en-GB"/>
           </a:p>
@@ -4419,7 +4514,7 @@
           <a:p>
             <a:fld id="{D4BA8270-C9CF-44CA-BE5A-02C2BDCCEDE4}" type="datetimeFigureOut">
               <a:rPr lang="en-GB" smtClean="0"/>
-              <a:t>12/04/2020</a:t>
+              <a:t>14/04/2020</a:t>
             </a:fld>
             <a:endParaRPr lang="en-GB"/>
           </a:p>
@@ -4599,7 +4694,7 @@
           <a:p>
             <a:fld id="{D4BA8270-C9CF-44CA-BE5A-02C2BDCCEDE4}" type="datetimeFigureOut">
               <a:rPr lang="en-GB" smtClean="0"/>
-              <a:t>12/04/2020</a:t>
+              <a:t>14/04/2020</a:t>
             </a:fld>
             <a:endParaRPr lang="en-GB"/>
           </a:p>
@@ -4769,7 +4864,7 @@
           <a:p>
             <a:fld id="{D4BA8270-C9CF-44CA-BE5A-02C2BDCCEDE4}" type="datetimeFigureOut">
               <a:rPr lang="en-GB" smtClean="0"/>
-              <a:t>12/04/2020</a:t>
+              <a:t>14/04/2020</a:t>
             </a:fld>
             <a:endParaRPr lang="en-GB"/>
           </a:p>
@@ -5016,7 +5111,7 @@
           <a:p>
             <a:fld id="{D4BA8270-C9CF-44CA-BE5A-02C2BDCCEDE4}" type="datetimeFigureOut">
               <a:rPr lang="en-GB" smtClean="0"/>
-              <a:t>12/04/2020</a:t>
+              <a:t>14/04/2020</a:t>
             </a:fld>
             <a:endParaRPr lang="en-GB"/>
           </a:p>
@@ -5308,7 +5403,7 @@
           <a:p>
             <a:fld id="{D4BA8270-C9CF-44CA-BE5A-02C2BDCCEDE4}" type="datetimeFigureOut">
               <a:rPr lang="en-GB" smtClean="0"/>
-              <a:t>12/04/2020</a:t>
+              <a:t>14/04/2020</a:t>
             </a:fld>
             <a:endParaRPr lang="en-GB"/>
           </a:p>
@@ -5752,7 +5847,7 @@
           <a:p>
             <a:fld id="{D4BA8270-C9CF-44CA-BE5A-02C2BDCCEDE4}" type="datetimeFigureOut">
               <a:rPr lang="en-GB" smtClean="0"/>
-              <a:t>12/04/2020</a:t>
+              <a:t>14/04/2020</a:t>
             </a:fld>
             <a:endParaRPr lang="en-GB"/>
           </a:p>
@@ -5870,7 +5965,7 @@
           <a:p>
             <a:fld id="{D4BA8270-C9CF-44CA-BE5A-02C2BDCCEDE4}" type="datetimeFigureOut">
               <a:rPr lang="en-GB" smtClean="0"/>
-              <a:t>12/04/2020</a:t>
+              <a:t>14/04/2020</a:t>
             </a:fld>
             <a:endParaRPr lang="en-GB"/>
           </a:p>
@@ -5965,7 +6060,7 @@
           <a:p>
             <a:fld id="{D4BA8270-C9CF-44CA-BE5A-02C2BDCCEDE4}" type="datetimeFigureOut">
               <a:rPr lang="en-GB" smtClean="0"/>
-              <a:t>12/04/2020</a:t>
+              <a:t>14/04/2020</a:t>
             </a:fld>
             <a:endParaRPr lang="en-GB"/>
           </a:p>
@@ -6244,7 +6339,7 @@
           <a:p>
             <a:fld id="{D4BA8270-C9CF-44CA-BE5A-02C2BDCCEDE4}" type="datetimeFigureOut">
               <a:rPr lang="en-GB" smtClean="0"/>
-              <a:t>12/04/2020</a:t>
+              <a:t>14/04/2020</a:t>
             </a:fld>
             <a:endParaRPr lang="en-GB"/>
           </a:p>
@@ -6519,7 +6614,7 @@
           <a:p>
             <a:fld id="{D4BA8270-C9CF-44CA-BE5A-02C2BDCCEDE4}" type="datetimeFigureOut">
               <a:rPr lang="en-GB" smtClean="0"/>
-              <a:t>12/04/2020</a:t>
+              <a:t>14/04/2020</a:t>
             </a:fld>
             <a:endParaRPr lang="en-GB"/>
           </a:p>
@@ -6948,7 +7043,7 @@
           <a:p>
             <a:fld id="{D4BA8270-C9CF-44CA-BE5A-02C2BDCCEDE4}" type="datetimeFigureOut">
               <a:rPr lang="en-GB" smtClean="0"/>
-              <a:t>12/04/2020</a:t>
+              <a:t>14/04/2020</a:t>
             </a:fld>
             <a:endParaRPr lang="en-GB"/>
           </a:p>
@@ -8340,11 +8435,7 @@
             </a:r>
             <a:r>
               <a:rPr lang="en-US" altLang="en-US" sz="1400" dirty="0" smtClean="0"/>
-              <a:t>, the </a:t>
-            </a:r>
-            <a:r>
-              <a:rPr lang="en-US" altLang="en-US" sz="1400" dirty="0" smtClean="0"/>
-              <a:t>instantiation </a:t>
+              <a:t>, the instantiation </a:t>
             </a:r>
             <a:r>
               <a:rPr lang="en-US" altLang="en-US" sz="1400" dirty="0"/>

</xml_diff>